<commit_message>
Update presentation with newspaper images
</commit_message>
<xml_diff>
--- a/docs/Presentation-1.pptx
+++ b/docs/Presentation-1.pptx
@@ -9,17 +9,18 @@
     <p:sldId id="257" r:id="rId3"/>
     <p:sldId id="258" r:id="rId4"/>
     <p:sldId id="259" r:id="rId5"/>
-    <p:sldId id="260" r:id="rId6"/>
-    <p:sldId id="272" r:id="rId7"/>
-    <p:sldId id="261" r:id="rId8"/>
-    <p:sldId id="270" r:id="rId9"/>
-    <p:sldId id="262" r:id="rId10"/>
-    <p:sldId id="268" r:id="rId11"/>
-    <p:sldId id="263" r:id="rId12"/>
-    <p:sldId id="271" r:id="rId13"/>
-    <p:sldId id="269" r:id="rId14"/>
-    <p:sldId id="266" r:id="rId15"/>
-    <p:sldId id="267" r:id="rId16"/>
+    <p:sldId id="273" r:id="rId6"/>
+    <p:sldId id="260" r:id="rId7"/>
+    <p:sldId id="272" r:id="rId8"/>
+    <p:sldId id="261" r:id="rId9"/>
+    <p:sldId id="270" r:id="rId10"/>
+    <p:sldId id="262" r:id="rId11"/>
+    <p:sldId id="268" r:id="rId12"/>
+    <p:sldId id="263" r:id="rId13"/>
+    <p:sldId id="271" r:id="rId14"/>
+    <p:sldId id="269" r:id="rId15"/>
+    <p:sldId id="266" r:id="rId16"/>
+    <p:sldId id="267" r:id="rId17"/>
   </p:sldIdLst>
   <p:sldSz cx="12192000" cy="6858000"/>
   <p:notesSz cx="6858000" cy="9144000"/>
@@ -13571,7 +13572,7 @@
           <a:noFill/>
           <a:extLst>
             <a:ext uri="{909E8E84-426E-40dd-AFC4-6F175D3DCCD1}">
-              <a14:hiddenFill xmlns:a14="http://schemas.microsoft.com/office/drawing/2010/main" xmlns="">
+              <a14:hiddenFill xmlns="" xmlns:a14="http://schemas.microsoft.com/office/drawing/2010/main">
                 <a:solidFill>
                   <a:srgbClr val="FFFFFF"/>
                 </a:solidFill>
@@ -13630,7 +13631,7 @@
             </a:ln>
             <a:extLst>
               <a:ext uri="{91240B29-F687-4f45-9708-019B960494DF}">
-                <a14:hiddenLine xmlns:a14="http://schemas.microsoft.com/office/drawing/2010/main" xmlns="" w="9525">
+                <a14:hiddenLine xmlns="" xmlns:a14="http://schemas.microsoft.com/office/drawing/2010/main" w="9525">
                   <a:solidFill>
                     <a:srgbClr val="000000"/>
                   </a:solidFill>
@@ -13720,7 +13721,7 @@
             </a:ln>
             <a:extLst>
               <a:ext uri="{91240B29-F687-4f45-9708-019B960494DF}">
-                <a14:hiddenLine xmlns:a14="http://schemas.microsoft.com/office/drawing/2010/main" xmlns="" w="9525">
+                <a14:hiddenLine xmlns="" xmlns:a14="http://schemas.microsoft.com/office/drawing/2010/main" w="9525">
                   <a:solidFill>
                     <a:srgbClr val="000000"/>
                   </a:solidFill>
@@ -13810,7 +13811,7 @@
             </a:ln>
             <a:extLst>
               <a:ext uri="{91240B29-F687-4f45-9708-019B960494DF}">
-                <a14:hiddenLine xmlns:a14="http://schemas.microsoft.com/office/drawing/2010/main" xmlns="" w="9525">
+                <a14:hiddenLine xmlns="" xmlns:a14="http://schemas.microsoft.com/office/drawing/2010/main" w="9525">
                   <a:solidFill>
                     <a:srgbClr val="000000"/>
                   </a:solidFill>
@@ -13844,7 +13845,7 @@
             </a:ln>
             <a:extLst>
               <a:ext uri="{91240B29-F687-4f45-9708-019B960494DF}">
-                <a14:hiddenLine xmlns:a14="http://schemas.microsoft.com/office/drawing/2010/main" xmlns="" w="9525">
+                <a14:hiddenLine xmlns="" xmlns:a14="http://schemas.microsoft.com/office/drawing/2010/main" w="9525">
                   <a:solidFill>
                     <a:srgbClr val="000000"/>
                   </a:solidFill>
@@ -13934,7 +13935,7 @@
             </a:ln>
             <a:extLst>
               <a:ext uri="{91240B29-F687-4f45-9708-019B960494DF}">
-                <a14:hiddenLine xmlns:a14="http://schemas.microsoft.com/office/drawing/2010/main" xmlns="" w="9525">
+                <a14:hiddenLine xmlns="" xmlns:a14="http://schemas.microsoft.com/office/drawing/2010/main" w="9525">
                   <a:solidFill>
                     <a:srgbClr val="000000"/>
                   </a:solidFill>
@@ -13996,7 +13997,7 @@
             </a:ln>
             <a:extLst>
               <a:ext uri="{91240B29-F687-4f45-9708-019B960494DF}">
-                <a14:hiddenLine xmlns:a14="http://schemas.microsoft.com/office/drawing/2010/main" xmlns="" w="9525">
+                <a14:hiddenLine xmlns="" xmlns:a14="http://schemas.microsoft.com/office/drawing/2010/main" w="9525">
                   <a:solidFill>
                     <a:srgbClr val="000000"/>
                   </a:solidFill>
@@ -14058,7 +14059,7 @@
             </a:ln>
             <a:extLst>
               <a:ext uri="{91240B29-F687-4f45-9708-019B960494DF}">
-                <a14:hiddenLine xmlns:a14="http://schemas.microsoft.com/office/drawing/2010/main" xmlns="" w="9525">
+                <a14:hiddenLine xmlns="" xmlns:a14="http://schemas.microsoft.com/office/drawing/2010/main" w="9525">
                   <a:solidFill>
                     <a:srgbClr val="000000"/>
                   </a:solidFill>
@@ -14148,7 +14149,7 @@
             </a:ln>
             <a:extLst>
               <a:ext uri="{91240B29-F687-4f45-9708-019B960494DF}">
-                <a14:hiddenLine xmlns:a14="http://schemas.microsoft.com/office/drawing/2010/main" xmlns="" w="9525">
+                <a14:hiddenLine xmlns="" xmlns:a14="http://schemas.microsoft.com/office/drawing/2010/main" w="9525">
                   <a:solidFill>
                     <a:srgbClr val="000000"/>
                   </a:solidFill>
@@ -14210,7 +14211,7 @@
             </a:ln>
             <a:extLst>
               <a:ext uri="{91240B29-F687-4f45-9708-019B960494DF}">
-                <a14:hiddenLine xmlns:a14="http://schemas.microsoft.com/office/drawing/2010/main" xmlns="" w="9525">
+                <a14:hiddenLine xmlns="" xmlns:a14="http://schemas.microsoft.com/office/drawing/2010/main" w="9525">
                   <a:solidFill>
                     <a:srgbClr val="000000"/>
                   </a:solidFill>
@@ -14272,7 +14273,7 @@
             </a:ln>
             <a:extLst>
               <a:ext uri="{91240B29-F687-4f45-9708-019B960494DF}">
-                <a14:hiddenLine xmlns:a14="http://schemas.microsoft.com/office/drawing/2010/main" xmlns="" w="9525">
+                <a14:hiddenLine xmlns="" xmlns:a14="http://schemas.microsoft.com/office/drawing/2010/main" w="9525">
                   <a:solidFill>
                     <a:srgbClr val="000000"/>
                   </a:solidFill>
@@ -14362,7 +14363,7 @@
             </a:ln>
             <a:extLst>
               <a:ext uri="{91240B29-F687-4f45-9708-019B960494DF}">
-                <a14:hiddenLine xmlns:a14="http://schemas.microsoft.com/office/drawing/2010/main" xmlns="" w="9525">
+                <a14:hiddenLine xmlns="" xmlns:a14="http://schemas.microsoft.com/office/drawing/2010/main" w="9525">
                   <a:solidFill>
                     <a:srgbClr val="000000"/>
                   </a:solidFill>
@@ -14452,7 +14453,7 @@
             </a:ln>
             <a:extLst>
               <a:ext uri="{91240B29-F687-4f45-9708-019B960494DF}">
-                <a14:hiddenLine xmlns:a14="http://schemas.microsoft.com/office/drawing/2010/main" xmlns="" w="9525">
+                <a14:hiddenLine xmlns="" xmlns:a14="http://schemas.microsoft.com/office/drawing/2010/main" w="9525">
                   <a:solidFill>
                     <a:srgbClr val="000000"/>
                   </a:solidFill>
@@ -14514,7 +14515,7 @@
             </a:ln>
             <a:extLst>
               <a:ext uri="{91240B29-F687-4f45-9708-019B960494DF}">
-                <a14:hiddenLine xmlns:a14="http://schemas.microsoft.com/office/drawing/2010/main" xmlns="" w="9525">
+                <a14:hiddenLine xmlns="" xmlns:a14="http://schemas.microsoft.com/office/drawing/2010/main" w="9525">
                   <a:solidFill>
                     <a:srgbClr val="000000"/>
                   </a:solidFill>
@@ -14624,7 +14625,7 @@
             </a:ln>
             <a:extLst>
               <a:ext uri="{91240B29-F687-4f45-9708-019B960494DF}">
-                <a14:hiddenLine xmlns:a14="http://schemas.microsoft.com/office/drawing/2010/main" xmlns="" w="9525">
+                <a14:hiddenLine xmlns="" xmlns:a14="http://schemas.microsoft.com/office/drawing/2010/main" w="9525">
                   <a:solidFill>
                     <a:srgbClr val="000000"/>
                   </a:solidFill>
@@ -14686,7 +14687,7 @@
             </a:ln>
             <a:extLst>
               <a:ext uri="{91240B29-F687-4f45-9708-019B960494DF}">
-                <a14:hiddenLine xmlns:a14="http://schemas.microsoft.com/office/drawing/2010/main" xmlns="" w="9525">
+                <a14:hiddenLine xmlns="" xmlns:a14="http://schemas.microsoft.com/office/drawing/2010/main" w="9525">
                   <a:solidFill>
                     <a:srgbClr val="000000"/>
                   </a:solidFill>
@@ -14776,7 +14777,7 @@
             </a:ln>
             <a:extLst>
               <a:ext uri="{91240B29-F687-4f45-9708-019B960494DF}">
-                <a14:hiddenLine xmlns:a14="http://schemas.microsoft.com/office/drawing/2010/main" xmlns="" w="9525">
+                <a14:hiddenLine xmlns="" xmlns:a14="http://schemas.microsoft.com/office/drawing/2010/main" w="9525">
                   <a:solidFill>
                     <a:srgbClr val="000000"/>
                   </a:solidFill>
@@ -14866,7 +14867,7 @@
             </a:ln>
             <a:extLst>
               <a:ext uri="{91240B29-F687-4f45-9708-019B960494DF}">
-                <a14:hiddenLine xmlns:a14="http://schemas.microsoft.com/office/drawing/2010/main" xmlns="" w="9525">
+                <a14:hiddenLine xmlns="" xmlns:a14="http://schemas.microsoft.com/office/drawing/2010/main" w="9525">
                   <a:solidFill>
                     <a:srgbClr val="000000"/>
                   </a:solidFill>
@@ -14928,7 +14929,7 @@
             </a:ln>
             <a:extLst>
               <a:ext uri="{91240B29-F687-4f45-9708-019B960494DF}">
-                <a14:hiddenLine xmlns:a14="http://schemas.microsoft.com/office/drawing/2010/main" xmlns="" w="9525">
+                <a14:hiddenLine xmlns="" xmlns:a14="http://schemas.microsoft.com/office/drawing/2010/main" w="9525">
                   <a:solidFill>
                     <a:srgbClr val="000000"/>
                   </a:solidFill>
@@ -15018,7 +15019,7 @@
             </a:ln>
             <a:extLst>
               <a:ext uri="{91240B29-F687-4f45-9708-019B960494DF}">
-                <a14:hiddenLine xmlns:a14="http://schemas.microsoft.com/office/drawing/2010/main" xmlns="" w="9525">
+                <a14:hiddenLine xmlns="" xmlns:a14="http://schemas.microsoft.com/office/drawing/2010/main" w="9525">
                   <a:solidFill>
                     <a:srgbClr val="000000"/>
                   </a:solidFill>
@@ -15108,7 +15109,7 @@
             </a:ln>
             <a:extLst>
               <a:ext uri="{91240B29-F687-4f45-9708-019B960494DF}">
-                <a14:hiddenLine xmlns:a14="http://schemas.microsoft.com/office/drawing/2010/main" xmlns="" w="9525">
+                <a14:hiddenLine xmlns="" xmlns:a14="http://schemas.microsoft.com/office/drawing/2010/main" w="9525">
                   <a:solidFill>
                     <a:srgbClr val="000000"/>
                   </a:solidFill>
@@ -15164,7 +15165,7 @@
             </a:ln>
             <a:extLst>
               <a:ext uri="{91240B29-F687-4f45-9708-019B960494DF}">
-                <a14:hiddenLine xmlns:a14="http://schemas.microsoft.com/office/drawing/2010/main" xmlns="" w="9525">
+                <a14:hiddenLine xmlns="" xmlns:a14="http://schemas.microsoft.com/office/drawing/2010/main" w="9525">
                   <a:solidFill>
                     <a:srgbClr val="000000"/>
                   </a:solidFill>
@@ -15254,7 +15255,7 @@
             </a:ln>
             <a:extLst>
               <a:ext uri="{91240B29-F687-4f45-9708-019B960494DF}">
-                <a14:hiddenLine xmlns:a14="http://schemas.microsoft.com/office/drawing/2010/main" xmlns="" w="9525">
+                <a14:hiddenLine xmlns="" xmlns:a14="http://schemas.microsoft.com/office/drawing/2010/main" w="9525">
                   <a:solidFill>
                     <a:srgbClr val="000000"/>
                   </a:solidFill>
@@ -15310,7 +15311,7 @@
             </a:ln>
             <a:extLst>
               <a:ext uri="{91240B29-F687-4f45-9708-019B960494DF}">
-                <a14:hiddenLine xmlns:a14="http://schemas.microsoft.com/office/drawing/2010/main" xmlns="" w="9525">
+                <a14:hiddenLine xmlns="" xmlns:a14="http://schemas.microsoft.com/office/drawing/2010/main" w="9525">
                   <a:solidFill>
                     <a:srgbClr val="000000"/>
                   </a:solidFill>
@@ -15400,7 +15401,7 @@
             </a:ln>
             <a:extLst>
               <a:ext uri="{91240B29-F687-4f45-9708-019B960494DF}">
-                <a14:hiddenLine xmlns:a14="http://schemas.microsoft.com/office/drawing/2010/main" xmlns="" w="9525">
+                <a14:hiddenLine xmlns="" xmlns:a14="http://schemas.microsoft.com/office/drawing/2010/main" w="9525">
                   <a:solidFill>
                     <a:srgbClr val="000000"/>
                   </a:solidFill>
@@ -15468,7 +15469,7 @@
             </a:ln>
             <a:extLst>
               <a:ext uri="{91240B29-F687-4f45-9708-019B960494DF}">
-                <a14:hiddenLine xmlns:a14="http://schemas.microsoft.com/office/drawing/2010/main" xmlns="" w="9525">
+                <a14:hiddenLine xmlns="" xmlns:a14="http://schemas.microsoft.com/office/drawing/2010/main" w="9525">
                   <a:solidFill>
                     <a:srgbClr val="000000"/>
                   </a:solidFill>
@@ -15558,7 +15559,7 @@
             </a:ln>
             <a:extLst>
               <a:ext uri="{91240B29-F687-4f45-9708-019B960494DF}">
-                <a14:hiddenLine xmlns:a14="http://schemas.microsoft.com/office/drawing/2010/main" xmlns="" w="9525">
+                <a14:hiddenLine xmlns="" xmlns:a14="http://schemas.microsoft.com/office/drawing/2010/main" w="9525">
                   <a:solidFill>
                     <a:srgbClr val="000000"/>
                   </a:solidFill>
@@ -15626,7 +15627,7 @@
             </a:ln>
             <a:extLst>
               <a:ext uri="{91240B29-F687-4f45-9708-019B960494DF}">
-                <a14:hiddenLine xmlns:a14="http://schemas.microsoft.com/office/drawing/2010/main" xmlns="" w="9525">
+                <a14:hiddenLine xmlns="" xmlns:a14="http://schemas.microsoft.com/office/drawing/2010/main" w="9525">
                   <a:solidFill>
                     <a:srgbClr val="000000"/>
                   </a:solidFill>
@@ -15716,7 +15717,7 @@
             </a:ln>
             <a:extLst>
               <a:ext uri="{91240B29-F687-4f45-9708-019B960494DF}">
-                <a14:hiddenLine xmlns:a14="http://schemas.microsoft.com/office/drawing/2010/main" xmlns="" w="9525">
+                <a14:hiddenLine xmlns="" xmlns:a14="http://schemas.microsoft.com/office/drawing/2010/main" w="9525">
                   <a:solidFill>
                     <a:srgbClr val="000000"/>
                   </a:solidFill>
@@ -15750,7 +15751,7 @@
             </a:ln>
             <a:extLst>
               <a:ext uri="{91240B29-F687-4f45-9708-019B960494DF}">
-                <a14:hiddenLine xmlns:a14="http://schemas.microsoft.com/office/drawing/2010/main" xmlns="" w="9525">
+                <a14:hiddenLine xmlns="" xmlns:a14="http://schemas.microsoft.com/office/drawing/2010/main" w="9525">
                   <a:solidFill>
                     <a:srgbClr val="000000"/>
                   </a:solidFill>
@@ -15840,7 +15841,7 @@
             </a:ln>
             <a:extLst>
               <a:ext uri="{91240B29-F687-4f45-9708-019B960494DF}">
-                <a14:hiddenLine xmlns:a14="http://schemas.microsoft.com/office/drawing/2010/main" xmlns="" w="9525">
+                <a14:hiddenLine xmlns="" xmlns:a14="http://schemas.microsoft.com/office/drawing/2010/main" w="9525">
                   <a:solidFill>
                     <a:srgbClr val="000000"/>
                   </a:solidFill>
@@ -15902,7 +15903,7 @@
             </a:ln>
             <a:extLst>
               <a:ext uri="{91240B29-F687-4f45-9708-019B960494DF}">
-                <a14:hiddenLine xmlns:a14="http://schemas.microsoft.com/office/drawing/2010/main" xmlns="" w="9525">
+                <a14:hiddenLine xmlns="" xmlns:a14="http://schemas.microsoft.com/office/drawing/2010/main" w="9525">
                   <a:solidFill>
                     <a:srgbClr val="000000"/>
                   </a:solidFill>
@@ -15964,7 +15965,7 @@
             </a:ln>
             <a:extLst>
               <a:ext uri="{91240B29-F687-4f45-9708-019B960494DF}">
-                <a14:hiddenLine xmlns:a14="http://schemas.microsoft.com/office/drawing/2010/main" xmlns="" w="9525">
+                <a14:hiddenLine xmlns="" xmlns:a14="http://schemas.microsoft.com/office/drawing/2010/main" w="9525">
                   <a:solidFill>
                     <a:srgbClr val="000000"/>
                   </a:solidFill>
@@ -16054,7 +16055,7 @@
             </a:ln>
             <a:extLst>
               <a:ext uri="{91240B29-F687-4f45-9708-019B960494DF}">
-                <a14:hiddenLine xmlns:a14="http://schemas.microsoft.com/office/drawing/2010/main" xmlns="" w="9525">
+                <a14:hiddenLine xmlns="" xmlns:a14="http://schemas.microsoft.com/office/drawing/2010/main" w="9525">
                   <a:solidFill>
                     <a:srgbClr val="000000"/>
                   </a:solidFill>
@@ -16122,7 +16123,7 @@
             </a:ln>
             <a:extLst>
               <a:ext uri="{91240B29-F687-4f45-9708-019B960494DF}">
-                <a14:hiddenLine xmlns:a14="http://schemas.microsoft.com/office/drawing/2010/main" xmlns="" w="9525">
+                <a14:hiddenLine xmlns="" xmlns:a14="http://schemas.microsoft.com/office/drawing/2010/main" w="9525">
                   <a:solidFill>
                     <a:srgbClr val="000000"/>
                   </a:solidFill>
@@ -16184,7 +16185,7 @@
             </a:ln>
             <a:extLst>
               <a:ext uri="{91240B29-F687-4f45-9708-019B960494DF}">
-                <a14:hiddenLine xmlns:a14="http://schemas.microsoft.com/office/drawing/2010/main" xmlns="" w="9525">
+                <a14:hiddenLine xmlns="" xmlns:a14="http://schemas.microsoft.com/office/drawing/2010/main" w="9525">
                   <a:solidFill>
                     <a:srgbClr val="000000"/>
                   </a:solidFill>
@@ -16274,7 +16275,7 @@
             </a:ln>
             <a:extLst>
               <a:ext uri="{91240B29-F687-4f45-9708-019B960494DF}">
-                <a14:hiddenLine xmlns:a14="http://schemas.microsoft.com/office/drawing/2010/main" xmlns="" w="9525">
+                <a14:hiddenLine xmlns="" xmlns:a14="http://schemas.microsoft.com/office/drawing/2010/main" w="9525">
                   <a:solidFill>
                     <a:srgbClr val="000000"/>
                   </a:solidFill>
@@ -16336,7 +16337,7 @@
             </a:ln>
             <a:extLst>
               <a:ext uri="{91240B29-F687-4f45-9708-019B960494DF}">
-                <a14:hiddenLine xmlns:a14="http://schemas.microsoft.com/office/drawing/2010/main" xmlns="" w="9525">
+                <a14:hiddenLine xmlns="" xmlns:a14="http://schemas.microsoft.com/office/drawing/2010/main" w="9525">
                   <a:solidFill>
                     <a:srgbClr val="000000"/>
                   </a:solidFill>
@@ -16426,7 +16427,7 @@
             </a:ln>
             <a:extLst>
               <a:ext uri="{91240B29-F687-4f45-9708-019B960494DF}">
-                <a14:hiddenLine xmlns:a14="http://schemas.microsoft.com/office/drawing/2010/main" xmlns="" w="9525">
+                <a14:hiddenLine xmlns="" xmlns:a14="http://schemas.microsoft.com/office/drawing/2010/main" w="9525">
                   <a:solidFill>
                     <a:srgbClr val="000000"/>
                   </a:solidFill>
@@ -16488,7 +16489,7 @@
             </a:ln>
             <a:extLst>
               <a:ext uri="{91240B29-F687-4f45-9708-019B960494DF}">
-                <a14:hiddenLine xmlns:a14="http://schemas.microsoft.com/office/drawing/2010/main" xmlns="" w="9525">
+                <a14:hiddenLine xmlns="" xmlns:a14="http://schemas.microsoft.com/office/drawing/2010/main" w="9525">
                   <a:solidFill>
                     <a:srgbClr val="000000"/>
                   </a:solidFill>
@@ -16578,7 +16579,7 @@
             </a:ln>
             <a:extLst>
               <a:ext uri="{91240B29-F687-4f45-9708-019B960494DF}">
-                <a14:hiddenLine xmlns:a14="http://schemas.microsoft.com/office/drawing/2010/main" xmlns="" w="9525">
+                <a14:hiddenLine xmlns="" xmlns:a14="http://schemas.microsoft.com/office/drawing/2010/main" w="9525">
                   <a:solidFill>
                     <a:srgbClr val="000000"/>
                   </a:solidFill>
@@ -16612,7 +16613,7 @@
             </a:ln>
             <a:extLst>
               <a:ext uri="{91240B29-F687-4f45-9708-019B960494DF}">
-                <a14:hiddenLine xmlns:a14="http://schemas.microsoft.com/office/drawing/2010/main" xmlns="" w="9525">
+                <a14:hiddenLine xmlns="" xmlns:a14="http://schemas.microsoft.com/office/drawing/2010/main" w="9525">
                   <a:solidFill>
                     <a:srgbClr val="000000"/>
                   </a:solidFill>
@@ -16677,7 +16678,7 @@
             </a:ln>
             <a:extLst>
               <a:ext uri="{91240B29-F687-4f45-9708-019B960494DF}">
-                <a14:hiddenLine xmlns:a14="http://schemas.microsoft.com/office/drawing/2010/main" xmlns="" w="9525">
+                <a14:hiddenLine xmlns="" xmlns:a14="http://schemas.microsoft.com/office/drawing/2010/main" w="9525">
                   <a:solidFill>
                     <a:srgbClr val="000000"/>
                   </a:solidFill>
@@ -16767,7 +16768,7 @@
             </a:ln>
             <a:extLst>
               <a:ext uri="{91240B29-F687-4f45-9708-019B960494DF}">
-                <a14:hiddenLine xmlns:a14="http://schemas.microsoft.com/office/drawing/2010/main" xmlns="" w="9525">
+                <a14:hiddenLine xmlns="" xmlns:a14="http://schemas.microsoft.com/office/drawing/2010/main" w="9525">
                   <a:solidFill>
                     <a:srgbClr val="000000"/>
                   </a:solidFill>
@@ -16829,7 +16830,7 @@
             </a:ln>
             <a:extLst>
               <a:ext uri="{91240B29-F687-4f45-9708-019B960494DF}">
-                <a14:hiddenLine xmlns:a14="http://schemas.microsoft.com/office/drawing/2010/main" xmlns="" w="9525">
+                <a14:hiddenLine xmlns="" xmlns:a14="http://schemas.microsoft.com/office/drawing/2010/main" w="9525">
                   <a:solidFill>
                     <a:srgbClr val="000000"/>
                   </a:solidFill>
@@ -16919,7 +16920,7 @@
             </a:ln>
             <a:extLst>
               <a:ext uri="{91240B29-F687-4f45-9708-019B960494DF}">
-                <a14:hiddenLine xmlns:a14="http://schemas.microsoft.com/office/drawing/2010/main" xmlns="" w="9525">
+                <a14:hiddenLine xmlns="" xmlns:a14="http://schemas.microsoft.com/office/drawing/2010/main" w="9525">
                   <a:solidFill>
                     <a:srgbClr val="000000"/>
                   </a:solidFill>
@@ -17009,7 +17010,7 @@
             </a:ln>
             <a:extLst>
               <a:ext uri="{91240B29-F687-4f45-9708-019B960494DF}">
-                <a14:hiddenLine xmlns:a14="http://schemas.microsoft.com/office/drawing/2010/main" xmlns="" w="9525">
+                <a14:hiddenLine xmlns="" xmlns:a14="http://schemas.microsoft.com/office/drawing/2010/main" w="9525">
                   <a:solidFill>
                     <a:srgbClr val="000000"/>
                   </a:solidFill>
@@ -17074,7 +17075,7 @@
             </a:ln>
             <a:extLst>
               <a:ext uri="{91240B29-F687-4f45-9708-019B960494DF}">
-                <a14:hiddenLine xmlns:a14="http://schemas.microsoft.com/office/drawing/2010/main" xmlns="" w="9525">
+                <a14:hiddenLine xmlns="" xmlns:a14="http://schemas.microsoft.com/office/drawing/2010/main" w="9525">
                   <a:solidFill>
                     <a:srgbClr val="000000"/>
                   </a:solidFill>
@@ -17136,7 +17137,7 @@
             </a:ln>
             <a:extLst>
               <a:ext uri="{91240B29-F687-4f45-9708-019B960494DF}">
-                <a14:hiddenLine xmlns:a14="http://schemas.microsoft.com/office/drawing/2010/main" xmlns="" w="9525">
+                <a14:hiddenLine xmlns="" xmlns:a14="http://schemas.microsoft.com/office/drawing/2010/main" w="9525">
                   <a:solidFill>
                     <a:srgbClr val="000000"/>
                   </a:solidFill>
@@ -17226,7 +17227,7 @@
             </a:ln>
             <a:extLst>
               <a:ext uri="{91240B29-F687-4f45-9708-019B960494DF}">
-                <a14:hiddenLine xmlns:a14="http://schemas.microsoft.com/office/drawing/2010/main" xmlns="" w="9525">
+                <a14:hiddenLine xmlns="" xmlns:a14="http://schemas.microsoft.com/office/drawing/2010/main" w="9525">
                   <a:solidFill>
                     <a:srgbClr val="000000"/>
                   </a:solidFill>
@@ -17316,7 +17317,7 @@
             </a:ln>
             <a:extLst>
               <a:ext uri="{91240B29-F687-4f45-9708-019B960494DF}">
-                <a14:hiddenLine xmlns:a14="http://schemas.microsoft.com/office/drawing/2010/main" xmlns="" w="9525">
+                <a14:hiddenLine xmlns="" xmlns:a14="http://schemas.microsoft.com/office/drawing/2010/main" w="9525">
                   <a:solidFill>
                     <a:srgbClr val="000000"/>
                   </a:solidFill>
@@ -17378,7 +17379,7 @@
             </a:ln>
             <a:extLst>
               <a:ext uri="{91240B29-F687-4f45-9708-019B960494DF}">
-                <a14:hiddenLine xmlns:a14="http://schemas.microsoft.com/office/drawing/2010/main" xmlns="" w="9525">
+                <a14:hiddenLine xmlns="" xmlns:a14="http://schemas.microsoft.com/office/drawing/2010/main" w="9525">
                   <a:solidFill>
                     <a:srgbClr val="000000"/>
                   </a:solidFill>
@@ -17498,7 +17499,7 @@
             </a:ln>
             <a:extLst>
               <a:ext uri="{91240B29-F687-4f45-9708-019B960494DF}">
-                <a14:hiddenLine xmlns:a14="http://schemas.microsoft.com/office/drawing/2010/main" xmlns="" w="9525">
+                <a14:hiddenLine xmlns="" xmlns:a14="http://schemas.microsoft.com/office/drawing/2010/main" w="9525">
                   <a:solidFill>
                     <a:srgbClr val="000000"/>
                   </a:solidFill>
@@ -17566,7 +17567,7 @@
             </a:ln>
             <a:extLst>
               <a:ext uri="{91240B29-F687-4f45-9708-019B960494DF}">
-                <a14:hiddenLine xmlns:a14="http://schemas.microsoft.com/office/drawing/2010/main" xmlns="" w="9525">
+                <a14:hiddenLine xmlns="" xmlns:a14="http://schemas.microsoft.com/office/drawing/2010/main" w="9525">
                   <a:solidFill>
                     <a:srgbClr val="000000"/>
                   </a:solidFill>
@@ -17656,7 +17657,7 @@
             </a:ln>
             <a:extLst>
               <a:ext uri="{91240B29-F687-4f45-9708-019B960494DF}">
-                <a14:hiddenLine xmlns:a14="http://schemas.microsoft.com/office/drawing/2010/main" xmlns="" w="9525">
+                <a14:hiddenLine xmlns="" xmlns:a14="http://schemas.microsoft.com/office/drawing/2010/main" w="9525">
                   <a:solidFill>
                     <a:srgbClr val="000000"/>
                   </a:solidFill>
@@ -17794,7 +17795,7 @@
           <a:p>
             <a:fld id="{9AB3A824-1A51-4B26-AD58-A6D8E14F6C04}" type="datetimeFigureOut">
               <a:rPr lang="en-US" smtClean="0"/>
-              <a:t>2023-12-03</a:t>
+              <a:t>2023-12-04</a:t>
             </a:fld>
             <a:endParaRPr lang="en-US"/>
           </a:p>
@@ -17866,13 +17867,13 @@
   <p:clrMapOvr>
     <a:masterClrMapping/>
   </p:clrMapOvr>
-  <mc:AlternateContent xmlns:mc="http://schemas.openxmlformats.org/markup-compatibility/2006">
-    <mc:Choice xmlns:p159="http://schemas.microsoft.com/office/powerpoint/2015/09/main" Requires="p159">
+  <mc:AlternateContent xmlns:mc="http://schemas.openxmlformats.org/markup-compatibility/2006" xmlns:p159="http://schemas.microsoft.com/office/powerpoint/2015/09/main">
+    <mc:Choice Requires="p159">
       <p:transition spd="slow">
         <p159:morph option="byObject"/>
       </p:transition>
     </mc:Choice>
-    <mc:Fallback>
+    <mc:Fallback xmlns="">
       <p:transition spd="slow">
         <p:fade/>
       </p:transition>
@@ -18075,7 +18076,7 @@
           <a:p>
             <a:fld id="{3CBC1C18-307B-4F68-A007-B5B542270E8D}" type="datetimeFigureOut">
               <a:rPr lang="en-US" smtClean="0"/>
-              <a:t>2023-12-03</a:t>
+              <a:t>2023-12-04</a:t>
             </a:fld>
             <a:endParaRPr lang="en-US"/>
           </a:p>
@@ -18138,13 +18139,13 @@
   <p:clrMapOvr>
     <a:masterClrMapping/>
   </p:clrMapOvr>
-  <mc:AlternateContent xmlns:mc="http://schemas.openxmlformats.org/markup-compatibility/2006">
-    <mc:Choice xmlns:p159="http://schemas.microsoft.com/office/powerpoint/2015/09/main" Requires="p159">
+  <mc:AlternateContent xmlns:mc="http://schemas.openxmlformats.org/markup-compatibility/2006" xmlns:p159="http://schemas.microsoft.com/office/powerpoint/2015/09/main">
+    <mc:Choice Requires="p159">
       <p:transition spd="slow">
         <p159:morph option="byObject"/>
       </p:transition>
     </mc:Choice>
-    <mc:Fallback>
+    <mc:Fallback xmlns="">
       <p:transition spd="slow">
         <p:fade/>
       </p:transition>
@@ -18288,7 +18289,7 @@
           <a:p>
             <a:fld id="{3CBC1C18-307B-4F68-A007-B5B542270E8D}" type="datetimeFigureOut">
               <a:rPr lang="en-US" smtClean="0"/>
-              <a:t>2023-12-03</a:t>
+              <a:t>2023-12-04</a:t>
             </a:fld>
             <a:endParaRPr lang="en-US"/>
           </a:p>
@@ -18351,13 +18352,13 @@
   <p:clrMapOvr>
     <a:masterClrMapping/>
   </p:clrMapOvr>
-  <mc:AlternateContent xmlns:mc="http://schemas.openxmlformats.org/markup-compatibility/2006">
-    <mc:Choice xmlns:p159="http://schemas.microsoft.com/office/powerpoint/2015/09/main" Requires="p159">
+  <mc:AlternateContent xmlns:mc="http://schemas.openxmlformats.org/markup-compatibility/2006" xmlns:p159="http://schemas.microsoft.com/office/powerpoint/2015/09/main">
+    <mc:Choice Requires="p159">
       <p:transition spd="slow">
         <p159:morph option="byObject"/>
       </p:transition>
     </mc:Choice>
-    <mc:Fallback>
+    <mc:Fallback xmlns="">
       <p:transition spd="slow">
         <p:fade/>
       </p:transition>
@@ -18568,7 +18569,7 @@
           <a:p>
             <a:fld id="{3CBC1C18-307B-4F68-A007-B5B542270E8D}" type="datetimeFigureOut">
               <a:rPr lang="en-US" smtClean="0"/>
-              <a:t>2023-12-03</a:t>
+              <a:t>2023-12-04</a:t>
             </a:fld>
             <a:endParaRPr lang="en-US"/>
           </a:p>
@@ -18869,13 +18870,13 @@
   <p:clrMapOvr>
     <a:masterClrMapping/>
   </p:clrMapOvr>
-  <mc:AlternateContent xmlns:mc="http://schemas.openxmlformats.org/markup-compatibility/2006">
-    <mc:Choice xmlns:p159="http://schemas.microsoft.com/office/powerpoint/2015/09/main" Requires="p159">
+  <mc:AlternateContent xmlns:mc="http://schemas.openxmlformats.org/markup-compatibility/2006" xmlns:p159="http://schemas.microsoft.com/office/powerpoint/2015/09/main">
+    <mc:Choice Requires="p159">
       <p:transition spd="slow">
         <p159:morph option="byObject"/>
       </p:transition>
     </mc:Choice>
-    <mc:Fallback>
+    <mc:Fallback xmlns="">
       <p:transition spd="slow">
         <p:fade/>
       </p:transition>
@@ -19019,7 +19020,7 @@
           <a:p>
             <a:fld id="{3CBC1C18-307B-4F68-A007-B5B542270E8D}" type="datetimeFigureOut">
               <a:rPr lang="en-US" smtClean="0"/>
-              <a:t>2023-12-03</a:t>
+              <a:t>2023-12-04</a:t>
             </a:fld>
             <a:endParaRPr lang="en-US"/>
           </a:p>
@@ -19082,13 +19083,13 @@
   <p:clrMapOvr>
     <a:masterClrMapping/>
   </p:clrMapOvr>
-  <mc:AlternateContent xmlns:mc="http://schemas.openxmlformats.org/markup-compatibility/2006">
-    <mc:Choice xmlns:p159="http://schemas.microsoft.com/office/powerpoint/2015/09/main" Requires="p159">
+  <mc:AlternateContent xmlns:mc="http://schemas.openxmlformats.org/markup-compatibility/2006" xmlns:p159="http://schemas.microsoft.com/office/powerpoint/2015/09/main">
+    <mc:Choice Requires="p159">
       <p:transition spd="slow">
         <p159:morph option="byObject"/>
       </p:transition>
     </mc:Choice>
-    <mc:Fallback>
+    <mc:Fallback xmlns="">
       <p:transition spd="slow">
         <p:fade/>
       </p:transition>
@@ -19582,7 +19583,7 @@
           <a:p>
             <a:fld id="{3CBC1C18-307B-4F68-A007-B5B542270E8D}" type="datetimeFigureOut">
               <a:rPr lang="en-US" smtClean="0"/>
-              <a:t>2023-12-03</a:t>
+              <a:t>2023-12-04</a:t>
             </a:fld>
             <a:endParaRPr lang="en-US"/>
           </a:p>
@@ -19645,13 +19646,13 @@
   <p:clrMapOvr>
     <a:masterClrMapping/>
   </p:clrMapOvr>
-  <mc:AlternateContent xmlns:mc="http://schemas.openxmlformats.org/markup-compatibility/2006">
-    <mc:Choice xmlns:p159="http://schemas.microsoft.com/office/powerpoint/2015/09/main" Requires="p159">
+  <mc:AlternateContent xmlns:mc="http://schemas.openxmlformats.org/markup-compatibility/2006" xmlns:p159="http://schemas.microsoft.com/office/powerpoint/2015/09/main">
+    <mc:Choice Requires="p159">
       <p:transition spd="slow">
         <p159:morph option="byObject"/>
       </p:transition>
     </mc:Choice>
-    <mc:Fallback>
+    <mc:Fallback xmlns="">
       <p:transition spd="slow">
         <p:fade/>
       </p:transition>
@@ -20316,7 +20317,7 @@
           <a:p>
             <a:fld id="{3CBC1C18-307B-4F68-A007-B5B542270E8D}" type="datetimeFigureOut">
               <a:rPr lang="en-US" smtClean="0"/>
-              <a:t>2023-12-03</a:t>
+              <a:t>2023-12-04</a:t>
             </a:fld>
             <a:endParaRPr lang="en-US"/>
           </a:p>
@@ -20379,13 +20380,13 @@
   <p:clrMapOvr>
     <a:masterClrMapping/>
   </p:clrMapOvr>
-  <mc:AlternateContent xmlns:mc="http://schemas.openxmlformats.org/markup-compatibility/2006">
-    <mc:Choice xmlns:p159="http://schemas.microsoft.com/office/powerpoint/2015/09/main" Requires="p159">
+  <mc:AlternateContent xmlns:mc="http://schemas.openxmlformats.org/markup-compatibility/2006" xmlns:p159="http://schemas.microsoft.com/office/powerpoint/2015/09/main">
+    <mc:Choice Requires="p159">
       <p:transition spd="slow">
         <p159:morph option="byObject"/>
       </p:transition>
     </mc:Choice>
-    <mc:Fallback>
+    <mc:Fallback xmlns="">
       <p:transition spd="slow">
         <p:fade/>
       </p:transition>
@@ -20502,7 +20503,7 @@
           <a:p>
             <a:fld id="{D857E33E-8B18-4087-B112-809917729534}" type="datetimeFigureOut">
               <a:rPr lang="en-US" smtClean="0"/>
-              <a:t>2023-12-03</a:t>
+              <a:t>2023-12-04</a:t>
             </a:fld>
             <a:endParaRPr lang="en-US"/>
           </a:p>
@@ -20564,13 +20565,13 @@
   <p:clrMapOvr>
     <a:masterClrMapping/>
   </p:clrMapOvr>
-  <mc:AlternateContent xmlns:mc="http://schemas.openxmlformats.org/markup-compatibility/2006">
-    <mc:Choice xmlns:p159="http://schemas.microsoft.com/office/powerpoint/2015/09/main" Requires="p159">
+  <mc:AlternateContent xmlns:mc="http://schemas.openxmlformats.org/markup-compatibility/2006" xmlns:p159="http://schemas.microsoft.com/office/powerpoint/2015/09/main">
+    <mc:Choice Requires="p159">
       <p:transition spd="slow">
         <p159:morph option="byObject"/>
       </p:transition>
     </mc:Choice>
-    <mc:Fallback>
+    <mc:Fallback xmlns="">
       <p:transition spd="slow">
         <p:fade/>
       </p:transition>
@@ -20696,7 +20697,7 @@
           <a:p>
             <a:fld id="{D3FFE419-2371-464F-8239-3959401C3561}" type="datetimeFigureOut">
               <a:rPr lang="en-US" smtClean="0"/>
-              <a:t>2023-12-03</a:t>
+              <a:t>2023-12-04</a:t>
             </a:fld>
             <a:endParaRPr lang="en-US"/>
           </a:p>
@@ -20758,13 +20759,13 @@
   <p:clrMapOvr>
     <a:masterClrMapping/>
   </p:clrMapOvr>
-  <mc:AlternateContent xmlns:mc="http://schemas.openxmlformats.org/markup-compatibility/2006">
-    <mc:Choice xmlns:p159="http://schemas.microsoft.com/office/powerpoint/2015/09/main" Requires="p159">
+  <mc:AlternateContent xmlns:mc="http://schemas.openxmlformats.org/markup-compatibility/2006" xmlns:p159="http://schemas.microsoft.com/office/powerpoint/2015/09/main">
+    <mc:Choice Requires="p159">
       <p:transition spd="slow">
         <p159:morph option="byObject"/>
       </p:transition>
     </mc:Choice>
-    <mc:Fallback>
+    <mc:Fallback xmlns="">
       <p:transition spd="slow">
         <p:fade/>
       </p:transition>
@@ -20880,7 +20881,7 @@
           <a:p>
             <a:fld id="{97D162C4-EDD9-4389-A98B-B87ECEA2A816}" type="datetimeFigureOut">
               <a:rPr lang="en-US" smtClean="0"/>
-              <a:t>2023-12-03</a:t>
+              <a:t>2023-12-04</a:t>
             </a:fld>
             <a:endParaRPr lang="en-US"/>
           </a:p>
@@ -20942,13 +20943,13 @@
   <p:clrMapOvr>
     <a:masterClrMapping/>
   </p:clrMapOvr>
-  <mc:AlternateContent xmlns:mc="http://schemas.openxmlformats.org/markup-compatibility/2006">
-    <mc:Choice xmlns:p159="http://schemas.microsoft.com/office/powerpoint/2015/09/main" Requires="p159">
+  <mc:AlternateContent xmlns:mc="http://schemas.openxmlformats.org/markup-compatibility/2006" xmlns:p159="http://schemas.microsoft.com/office/powerpoint/2015/09/main">
+    <mc:Choice Requires="p159">
       <p:transition spd="slow">
         <p159:morph option="byObject"/>
       </p:transition>
     </mc:Choice>
-    <mc:Fallback>
+    <mc:Fallback xmlns="">
       <p:transition spd="slow">
         <p:fade/>
       </p:transition>
@@ -21145,7 +21146,7 @@
           <a:p>
             <a:fld id="{3E5059C3-6A89-4494-99FF-5A4D6FFD50EB}" type="datetimeFigureOut">
               <a:rPr lang="en-US" smtClean="0"/>
-              <a:t>2023-12-03</a:t>
+              <a:t>2023-12-04</a:t>
             </a:fld>
             <a:endParaRPr lang="en-US"/>
           </a:p>
@@ -21207,13 +21208,13 @@
   <p:clrMapOvr>
     <a:masterClrMapping/>
   </p:clrMapOvr>
-  <mc:AlternateContent xmlns:mc="http://schemas.openxmlformats.org/markup-compatibility/2006">
-    <mc:Choice xmlns:p159="http://schemas.microsoft.com/office/powerpoint/2015/09/main" Requires="p159">
+  <mc:AlternateContent xmlns:mc="http://schemas.openxmlformats.org/markup-compatibility/2006" xmlns:p159="http://schemas.microsoft.com/office/powerpoint/2015/09/main">
+    <mc:Choice Requires="p159">
       <p:transition spd="slow">
         <p159:morph option="byObject"/>
       </p:transition>
     </mc:Choice>
-    <mc:Fallback>
+    <mc:Fallback xmlns="">
       <p:transition spd="slow">
         <p:fade/>
       </p:transition>
@@ -21390,7 +21391,7 @@
           <a:p>
             <a:fld id="{CA954B2F-12DE-47F5-8894-472B206D2E1E}" type="datetimeFigureOut">
               <a:rPr lang="en-US" smtClean="0"/>
-              <a:t>2023-12-03</a:t>
+              <a:t>2023-12-04</a:t>
             </a:fld>
             <a:endParaRPr lang="en-US"/>
           </a:p>
@@ -21452,13 +21453,13 @@
   <p:clrMapOvr>
     <a:masterClrMapping/>
   </p:clrMapOvr>
-  <mc:AlternateContent xmlns:mc="http://schemas.openxmlformats.org/markup-compatibility/2006">
-    <mc:Choice xmlns:p159="http://schemas.microsoft.com/office/powerpoint/2015/09/main" Requires="p159">
+  <mc:AlternateContent xmlns:mc="http://schemas.openxmlformats.org/markup-compatibility/2006" xmlns:p159="http://schemas.microsoft.com/office/powerpoint/2015/09/main">
+    <mc:Choice Requires="p159">
       <p:transition spd="slow">
         <p159:morph option="byObject"/>
       </p:transition>
     </mc:Choice>
-    <mc:Fallback>
+    <mc:Fallback xmlns="">
       <p:transition spd="slow">
         <p:fade/>
       </p:transition>
@@ -21784,7 +21785,7 @@
           <a:p>
             <a:fld id="{3F30E46F-7819-4ACF-B48B-48222C2ACC88}" type="datetimeFigureOut">
               <a:rPr lang="en-US" smtClean="0"/>
-              <a:t>2023-12-03</a:t>
+              <a:t>2023-12-04</a:t>
             </a:fld>
             <a:endParaRPr lang="en-US"/>
           </a:p>
@@ -21846,13 +21847,13 @@
   <p:clrMapOvr>
     <a:masterClrMapping/>
   </p:clrMapOvr>
-  <mc:AlternateContent xmlns:mc="http://schemas.openxmlformats.org/markup-compatibility/2006">
-    <mc:Choice xmlns:p159="http://schemas.microsoft.com/office/powerpoint/2015/09/main" Requires="p159">
+  <mc:AlternateContent xmlns:mc="http://schemas.openxmlformats.org/markup-compatibility/2006" xmlns:p159="http://schemas.microsoft.com/office/powerpoint/2015/09/main">
+    <mc:Choice Requires="p159">
       <p:transition spd="slow">
         <p159:morph option="byObject"/>
       </p:transition>
     </mc:Choice>
-    <mc:Fallback>
+    <mc:Fallback xmlns="">
       <p:transition spd="slow">
         <p:fade/>
       </p:transition>
@@ -21917,7 +21918,7 @@
           <a:p>
             <a:fld id="{1FAF3416-4057-4DAA-829D-4CA07428D088}" type="datetimeFigureOut">
               <a:rPr lang="en-US" smtClean="0"/>
-              <a:t>2023-12-03</a:t>
+              <a:t>2023-12-04</a:t>
             </a:fld>
             <a:endParaRPr lang="en-US"/>
           </a:p>
@@ -21979,13 +21980,13 @@
   <p:clrMapOvr>
     <a:masterClrMapping/>
   </p:clrMapOvr>
-  <mc:AlternateContent xmlns:mc="http://schemas.openxmlformats.org/markup-compatibility/2006">
-    <mc:Choice xmlns:p159="http://schemas.microsoft.com/office/powerpoint/2015/09/main" Requires="p159">
+  <mc:AlternateContent xmlns:mc="http://schemas.openxmlformats.org/markup-compatibility/2006" xmlns:p159="http://schemas.microsoft.com/office/powerpoint/2015/09/main">
+    <mc:Choice Requires="p159">
       <p:transition spd="slow">
         <p159:morph option="byObject"/>
       </p:transition>
     </mc:Choice>
-    <mc:Fallback>
+    <mc:Fallback xmlns="">
       <p:transition spd="slow">
         <p:fade/>
       </p:transition>
@@ -22028,7 +22029,7 @@
           <a:p>
             <a:fld id="{921D9284-D300-4297-87F7-E791DCC15DB1}" type="datetimeFigureOut">
               <a:rPr lang="en-US" smtClean="0"/>
-              <a:t>2023-12-03</a:t>
+              <a:t>2023-12-04</a:t>
             </a:fld>
             <a:endParaRPr lang="en-US"/>
           </a:p>
@@ -22090,13 +22091,13 @@
   <p:clrMapOvr>
     <a:masterClrMapping/>
   </p:clrMapOvr>
-  <mc:AlternateContent xmlns:mc="http://schemas.openxmlformats.org/markup-compatibility/2006">
-    <mc:Choice xmlns:p159="http://schemas.microsoft.com/office/powerpoint/2015/09/main" Requires="p159">
+  <mc:AlternateContent xmlns:mc="http://schemas.openxmlformats.org/markup-compatibility/2006" xmlns:p159="http://schemas.microsoft.com/office/powerpoint/2015/09/main">
+    <mc:Choice Requires="p159">
       <p:transition spd="slow">
         <p159:morph option="byObject"/>
       </p:transition>
     </mc:Choice>
-    <mc:Fallback>
+    <mc:Fallback xmlns="">
       <p:transition spd="slow">
         <p:fade/>
       </p:transition>
@@ -22291,7 +22292,7 @@
           <a:p>
             <a:fld id="{37D525BB-DA17-4BA0-B3C8-3AC3ABC827E6}" type="datetimeFigureOut">
               <a:rPr lang="en-US" smtClean="0"/>
-              <a:t>2023-12-03</a:t>
+              <a:t>2023-12-04</a:t>
             </a:fld>
             <a:endParaRPr lang="en-US"/>
           </a:p>
@@ -22353,13 +22354,13 @@
   <p:clrMapOvr>
     <a:masterClrMapping/>
   </p:clrMapOvr>
-  <mc:AlternateContent xmlns:mc="http://schemas.openxmlformats.org/markup-compatibility/2006">
-    <mc:Choice xmlns:p159="http://schemas.microsoft.com/office/powerpoint/2015/09/main" Requires="p159">
+  <mc:AlternateContent xmlns:mc="http://schemas.openxmlformats.org/markup-compatibility/2006" xmlns:p159="http://schemas.microsoft.com/office/powerpoint/2015/09/main">
+    <mc:Choice Requires="p159">
       <p:transition spd="slow">
         <p159:morph option="byObject"/>
       </p:transition>
     </mc:Choice>
-    <mc:Fallback>
+    <mc:Fallback xmlns="">
       <p:transition spd="slow">
         <p:fade/>
       </p:transition>
@@ -22585,7 +22586,7 @@
           <a:p>
             <a:fld id="{B16C4C9A-3960-41CF-A4E9-2A8FB932454B}" type="datetimeFigureOut">
               <a:rPr lang="en-US" smtClean="0"/>
-              <a:t>2023-12-03</a:t>
+              <a:t>2023-12-04</a:t>
             </a:fld>
             <a:endParaRPr lang="en-US"/>
           </a:p>
@@ -22647,13 +22648,13 @@
   <p:clrMapOvr>
     <a:masterClrMapping/>
   </p:clrMapOvr>
-  <mc:AlternateContent xmlns:mc="http://schemas.openxmlformats.org/markup-compatibility/2006">
-    <mc:Choice xmlns:p159="http://schemas.microsoft.com/office/powerpoint/2015/09/main" Requires="p159">
+  <mc:AlternateContent xmlns:mc="http://schemas.openxmlformats.org/markup-compatibility/2006" xmlns:p159="http://schemas.microsoft.com/office/powerpoint/2015/09/main">
+    <mc:Choice Requires="p159">
       <p:transition spd="slow">
         <p159:morph option="byObject"/>
       </p:transition>
     </mc:Choice>
-    <mc:Fallback>
+    <mc:Fallback xmlns="">
       <p:transition spd="slow">
         <p:fade/>
       </p:transition>
@@ -22724,7 +22725,7 @@
           <a:noFill/>
           <a:extLst>
             <a:ext uri="{909E8E84-426E-40dd-AFC4-6F175D3DCCD1}">
-              <a14:hiddenFill xmlns:a14="http://schemas.microsoft.com/office/drawing/2010/main" xmlns="">
+              <a14:hiddenFill xmlns="" xmlns:a14="http://schemas.microsoft.com/office/drawing/2010/main">
                 <a:solidFill>
                   <a:srgbClr val="FFFFFF"/>
                 </a:solidFill>
@@ -22798,7 +22799,7 @@
               </a:ln>
               <a:extLst>
                 <a:ext uri="{91240B29-F687-4f45-9708-019B960494DF}">
-                  <a14:hiddenLine xmlns:a14="http://schemas.microsoft.com/office/drawing/2010/main" xmlns="" w="9525">
+                  <a14:hiddenLine xmlns="" xmlns:a14="http://schemas.microsoft.com/office/drawing/2010/main" w="9525">
                     <a:solidFill>
                       <a:srgbClr val="000000"/>
                     </a:solidFill>
@@ -22888,7 +22889,7 @@
               </a:ln>
               <a:extLst>
                 <a:ext uri="{91240B29-F687-4f45-9708-019B960494DF}">
-                  <a14:hiddenLine xmlns:a14="http://schemas.microsoft.com/office/drawing/2010/main" xmlns="" w="9525">
+                  <a14:hiddenLine xmlns="" xmlns:a14="http://schemas.microsoft.com/office/drawing/2010/main" w="9525">
                     <a:solidFill>
                       <a:srgbClr val="000000"/>
                     </a:solidFill>
@@ -22978,7 +22979,7 @@
               </a:ln>
               <a:extLst>
                 <a:ext uri="{91240B29-F687-4f45-9708-019B960494DF}">
-                  <a14:hiddenLine xmlns:a14="http://schemas.microsoft.com/office/drawing/2010/main" xmlns="" w="9525">
+                  <a14:hiddenLine xmlns="" xmlns:a14="http://schemas.microsoft.com/office/drawing/2010/main" w="9525">
                     <a:solidFill>
                       <a:srgbClr val="000000"/>
                     </a:solidFill>
@@ -23040,7 +23041,7 @@
               </a:ln>
               <a:extLst>
                 <a:ext uri="{91240B29-F687-4f45-9708-019B960494DF}">
-                  <a14:hiddenLine xmlns:a14="http://schemas.microsoft.com/office/drawing/2010/main" xmlns="" w="9525">
+                  <a14:hiddenLine xmlns="" xmlns:a14="http://schemas.microsoft.com/office/drawing/2010/main" w="9525">
                     <a:solidFill>
                       <a:srgbClr val="000000"/>
                     </a:solidFill>
@@ -23130,7 +23131,7 @@
               </a:ln>
               <a:extLst>
                 <a:ext uri="{91240B29-F687-4f45-9708-019B960494DF}">
-                  <a14:hiddenLine xmlns:a14="http://schemas.microsoft.com/office/drawing/2010/main" xmlns="" w="9525">
+                  <a14:hiddenLine xmlns="" xmlns:a14="http://schemas.microsoft.com/office/drawing/2010/main" w="9525">
                     <a:solidFill>
                       <a:srgbClr val="000000"/>
                     </a:solidFill>
@@ -23192,7 +23193,7 @@
               </a:ln>
               <a:extLst>
                 <a:ext uri="{91240B29-F687-4f45-9708-019B960494DF}">
-                  <a14:hiddenLine xmlns:a14="http://schemas.microsoft.com/office/drawing/2010/main" xmlns="" w="9525">
+                  <a14:hiddenLine xmlns="" xmlns:a14="http://schemas.microsoft.com/office/drawing/2010/main" w="9525">
                     <a:solidFill>
                       <a:srgbClr val="000000"/>
                     </a:solidFill>
@@ -23254,7 +23255,7 @@
               </a:ln>
               <a:extLst>
                 <a:ext uri="{91240B29-F687-4f45-9708-019B960494DF}">
-                  <a14:hiddenLine xmlns:a14="http://schemas.microsoft.com/office/drawing/2010/main" xmlns="" w="9525">
+                  <a14:hiddenLine xmlns="" xmlns:a14="http://schemas.microsoft.com/office/drawing/2010/main" w="9525">
                     <a:solidFill>
                       <a:srgbClr val="000000"/>
                     </a:solidFill>
@@ -23344,7 +23345,7 @@
               </a:ln>
               <a:extLst>
                 <a:ext uri="{91240B29-F687-4f45-9708-019B960494DF}">
-                  <a14:hiddenLine xmlns:a14="http://schemas.microsoft.com/office/drawing/2010/main" xmlns="" w="9525">
+                  <a14:hiddenLine xmlns="" xmlns:a14="http://schemas.microsoft.com/office/drawing/2010/main" w="9525">
                     <a:solidFill>
                       <a:srgbClr val="000000"/>
                     </a:solidFill>
@@ -23434,7 +23435,7 @@
               </a:ln>
               <a:extLst>
                 <a:ext uri="{91240B29-F687-4f45-9708-019B960494DF}">
-                  <a14:hiddenLine xmlns:a14="http://schemas.microsoft.com/office/drawing/2010/main" xmlns="" w="9525">
+                  <a14:hiddenLine xmlns="" xmlns:a14="http://schemas.microsoft.com/office/drawing/2010/main" w="9525">
                     <a:solidFill>
                       <a:srgbClr val="000000"/>
                     </a:solidFill>
@@ -23496,7 +23497,7 @@
               </a:ln>
               <a:extLst>
                 <a:ext uri="{91240B29-F687-4f45-9708-019B960494DF}">
-                  <a14:hiddenLine xmlns:a14="http://schemas.microsoft.com/office/drawing/2010/main" xmlns="" w="9525">
+                  <a14:hiddenLine xmlns="" xmlns:a14="http://schemas.microsoft.com/office/drawing/2010/main" w="9525">
                     <a:solidFill>
                       <a:srgbClr val="000000"/>
                     </a:solidFill>
@@ -23606,7 +23607,7 @@
               </a:ln>
               <a:extLst>
                 <a:ext uri="{91240B29-F687-4f45-9708-019B960494DF}">
-                  <a14:hiddenLine xmlns:a14="http://schemas.microsoft.com/office/drawing/2010/main" xmlns="" w="9525">
+                  <a14:hiddenLine xmlns="" xmlns:a14="http://schemas.microsoft.com/office/drawing/2010/main" w="9525">
                     <a:solidFill>
                       <a:srgbClr val="000000"/>
                     </a:solidFill>
@@ -23690,7 +23691,7 @@
               </a:ln>
               <a:extLst>
                 <a:ext uri="{91240B29-F687-4f45-9708-019B960494DF}">
-                  <a14:hiddenLine xmlns:a14="http://schemas.microsoft.com/office/drawing/2010/main" xmlns="" w="9525">
+                  <a14:hiddenLine xmlns="" xmlns:a14="http://schemas.microsoft.com/office/drawing/2010/main" w="9525">
                     <a:solidFill>
                       <a:srgbClr val="000000"/>
                     </a:solidFill>
@@ -23752,7 +23753,7 @@
               </a:ln>
               <a:extLst>
                 <a:ext uri="{91240B29-F687-4f45-9708-019B960494DF}">
-                  <a14:hiddenLine xmlns:a14="http://schemas.microsoft.com/office/drawing/2010/main" xmlns="" w="9525">
+                  <a14:hiddenLine xmlns="" xmlns:a14="http://schemas.microsoft.com/office/drawing/2010/main" w="9525">
                     <a:solidFill>
                       <a:srgbClr val="000000"/>
                     </a:solidFill>
@@ -23814,7 +23815,7 @@
               </a:ln>
               <a:extLst>
                 <a:ext uri="{91240B29-F687-4f45-9708-019B960494DF}">
-                  <a14:hiddenLine xmlns:a14="http://schemas.microsoft.com/office/drawing/2010/main" xmlns="" w="9525">
+                  <a14:hiddenLine xmlns="" xmlns:a14="http://schemas.microsoft.com/office/drawing/2010/main" w="9525">
                     <a:solidFill>
                       <a:srgbClr val="000000"/>
                     </a:solidFill>
@@ -23904,7 +23905,7 @@
               </a:ln>
               <a:extLst>
                 <a:ext uri="{91240B29-F687-4f45-9708-019B960494DF}">
-                  <a14:hiddenLine xmlns:a14="http://schemas.microsoft.com/office/drawing/2010/main" xmlns="" w="9525">
+                  <a14:hiddenLine xmlns="" xmlns:a14="http://schemas.microsoft.com/office/drawing/2010/main" w="9525">
                     <a:solidFill>
                       <a:srgbClr val="000000"/>
                     </a:solidFill>
@@ -23938,7 +23939,7 @@
               </a:ln>
               <a:extLst>
                 <a:ext uri="{91240B29-F687-4f45-9708-019B960494DF}">
-                  <a14:hiddenLine xmlns:a14="http://schemas.microsoft.com/office/drawing/2010/main" xmlns="" w="9525">
+                  <a14:hiddenLine xmlns="" xmlns:a14="http://schemas.microsoft.com/office/drawing/2010/main" w="9525">
                     <a:solidFill>
                       <a:srgbClr val="000000"/>
                     </a:solidFill>
@@ -24003,7 +24004,7 @@
               </a:ln>
               <a:extLst>
                 <a:ext uri="{91240B29-F687-4f45-9708-019B960494DF}">
-                  <a14:hiddenLine xmlns:a14="http://schemas.microsoft.com/office/drawing/2010/main" xmlns="" w="9525">
+                  <a14:hiddenLine xmlns="" xmlns:a14="http://schemas.microsoft.com/office/drawing/2010/main" w="9525">
                     <a:solidFill>
                       <a:srgbClr val="000000"/>
                     </a:solidFill>
@@ -24093,7 +24094,7 @@
               </a:ln>
               <a:extLst>
                 <a:ext uri="{91240B29-F687-4f45-9708-019B960494DF}">
-                  <a14:hiddenLine xmlns:a14="http://schemas.microsoft.com/office/drawing/2010/main" xmlns="" w="9525">
+                  <a14:hiddenLine xmlns="" xmlns:a14="http://schemas.microsoft.com/office/drawing/2010/main" w="9525">
                     <a:solidFill>
                       <a:srgbClr val="000000"/>
                     </a:solidFill>
@@ -24155,7 +24156,7 @@
               </a:ln>
               <a:extLst>
                 <a:ext uri="{91240B29-F687-4f45-9708-019B960494DF}">
-                  <a14:hiddenLine xmlns:a14="http://schemas.microsoft.com/office/drawing/2010/main" xmlns="" w="9525">
+                  <a14:hiddenLine xmlns="" xmlns:a14="http://schemas.microsoft.com/office/drawing/2010/main" w="9525">
                     <a:solidFill>
                       <a:srgbClr val="000000"/>
                     </a:solidFill>
@@ -24245,7 +24246,7 @@
               </a:ln>
               <a:extLst>
                 <a:ext uri="{91240B29-F687-4f45-9708-019B960494DF}">
-                  <a14:hiddenLine xmlns:a14="http://schemas.microsoft.com/office/drawing/2010/main" xmlns="" w="9525">
+                  <a14:hiddenLine xmlns="" xmlns:a14="http://schemas.microsoft.com/office/drawing/2010/main" w="9525">
                     <a:solidFill>
                       <a:srgbClr val="000000"/>
                     </a:solidFill>
@@ -24310,7 +24311,7 @@
               </a:ln>
               <a:extLst>
                 <a:ext uri="{91240B29-F687-4f45-9708-019B960494DF}">
-                  <a14:hiddenLine xmlns:a14="http://schemas.microsoft.com/office/drawing/2010/main" xmlns="" w="9525">
+                  <a14:hiddenLine xmlns="" xmlns:a14="http://schemas.microsoft.com/office/drawing/2010/main" w="9525">
                     <a:solidFill>
                       <a:srgbClr val="000000"/>
                     </a:solidFill>
@@ -24372,7 +24373,7 @@
               </a:ln>
               <a:extLst>
                 <a:ext uri="{91240B29-F687-4f45-9708-019B960494DF}">
-                  <a14:hiddenLine xmlns:a14="http://schemas.microsoft.com/office/drawing/2010/main" xmlns="" w="9525">
+                  <a14:hiddenLine xmlns="" xmlns:a14="http://schemas.microsoft.com/office/drawing/2010/main" w="9525">
                     <a:solidFill>
                       <a:srgbClr val="000000"/>
                     </a:solidFill>
@@ -24462,7 +24463,7 @@
               </a:ln>
               <a:extLst>
                 <a:ext uri="{91240B29-F687-4f45-9708-019B960494DF}">
-                  <a14:hiddenLine xmlns:a14="http://schemas.microsoft.com/office/drawing/2010/main" xmlns="" w="9525">
+                  <a14:hiddenLine xmlns="" xmlns:a14="http://schemas.microsoft.com/office/drawing/2010/main" w="9525">
                     <a:solidFill>
                       <a:srgbClr val="000000"/>
                     </a:solidFill>
@@ -24552,7 +24553,7 @@
               </a:ln>
               <a:extLst>
                 <a:ext uri="{91240B29-F687-4f45-9708-019B960494DF}">
-                  <a14:hiddenLine xmlns:a14="http://schemas.microsoft.com/office/drawing/2010/main" xmlns="" w="9525">
+                  <a14:hiddenLine xmlns="" xmlns:a14="http://schemas.microsoft.com/office/drawing/2010/main" w="9525">
                     <a:solidFill>
                       <a:srgbClr val="000000"/>
                     </a:solidFill>
@@ -24617,7 +24618,7 @@
               </a:ln>
               <a:extLst>
                 <a:ext uri="{91240B29-F687-4f45-9708-019B960494DF}">
-                  <a14:hiddenLine xmlns:a14="http://schemas.microsoft.com/office/drawing/2010/main" xmlns="" w="9525">
+                  <a14:hiddenLine xmlns="" xmlns:a14="http://schemas.microsoft.com/office/drawing/2010/main" w="9525">
                     <a:solidFill>
                       <a:srgbClr val="000000"/>
                     </a:solidFill>
@@ -24737,7 +24738,7 @@
               </a:ln>
               <a:extLst>
                 <a:ext uri="{91240B29-F687-4f45-9708-019B960494DF}">
-                  <a14:hiddenLine xmlns:a14="http://schemas.microsoft.com/office/drawing/2010/main" xmlns="" w="9525">
+                  <a14:hiddenLine xmlns="" xmlns:a14="http://schemas.microsoft.com/office/drawing/2010/main" w="9525">
                     <a:solidFill>
                       <a:srgbClr val="000000"/>
                     </a:solidFill>
@@ -24818,7 +24819,7 @@
               </a:ln>
               <a:extLst>
                 <a:ext uri="{91240B29-F687-4f45-9708-019B960494DF}">
-                  <a14:hiddenLine xmlns:a14="http://schemas.microsoft.com/office/drawing/2010/main" xmlns="" w="9525">
+                  <a14:hiddenLine xmlns="" xmlns:a14="http://schemas.microsoft.com/office/drawing/2010/main" w="9525">
                     <a:solidFill>
                       <a:srgbClr val="000000"/>
                     </a:solidFill>
@@ -24933,7 +24934,7 @@
               </a:ln>
               <a:extLst>
                 <a:ext uri="{91240B29-F687-4f45-9708-019B960494DF}">
-                  <a14:hiddenLine xmlns:a14="http://schemas.microsoft.com/office/drawing/2010/main" xmlns="" w="9525">
+                  <a14:hiddenLine xmlns="" xmlns:a14="http://schemas.microsoft.com/office/drawing/2010/main" w="9525">
                     <a:solidFill>
                       <a:srgbClr val="000000"/>
                     </a:solidFill>
@@ -25023,7 +25024,7 @@
               </a:ln>
               <a:extLst>
                 <a:ext uri="{91240B29-F687-4f45-9708-019B960494DF}">
-                  <a14:hiddenLine xmlns:a14="http://schemas.microsoft.com/office/drawing/2010/main" xmlns="" w="9525">
+                  <a14:hiddenLine xmlns="" xmlns:a14="http://schemas.microsoft.com/office/drawing/2010/main" w="9525">
                     <a:solidFill>
                       <a:srgbClr val="000000"/>
                     </a:solidFill>
@@ -25088,7 +25089,7 @@
               </a:ln>
               <a:extLst>
                 <a:ext uri="{91240B29-F687-4f45-9708-019B960494DF}">
-                  <a14:hiddenLine xmlns:a14="http://schemas.microsoft.com/office/drawing/2010/main" xmlns="" w="9525">
+                  <a14:hiddenLine xmlns="" xmlns:a14="http://schemas.microsoft.com/office/drawing/2010/main" w="9525">
                     <a:solidFill>
                       <a:srgbClr val="000000"/>
                     </a:solidFill>
@@ -25178,7 +25179,7 @@
               </a:ln>
               <a:extLst>
                 <a:ext uri="{91240B29-F687-4f45-9708-019B960494DF}">
-                  <a14:hiddenLine xmlns:a14="http://schemas.microsoft.com/office/drawing/2010/main" xmlns="" w="9525">
+                  <a14:hiddenLine xmlns="" xmlns:a14="http://schemas.microsoft.com/office/drawing/2010/main" w="9525">
                     <a:solidFill>
                       <a:srgbClr val="000000"/>
                     </a:solidFill>
@@ -25246,7 +25247,7 @@
               </a:ln>
               <a:extLst>
                 <a:ext uri="{91240B29-F687-4f45-9708-019B960494DF}">
-                  <a14:hiddenLine xmlns:a14="http://schemas.microsoft.com/office/drawing/2010/main" xmlns="" w="9525">
+                  <a14:hiddenLine xmlns="" xmlns:a14="http://schemas.microsoft.com/office/drawing/2010/main" w="9525">
                     <a:solidFill>
                       <a:srgbClr val="000000"/>
                     </a:solidFill>
@@ -25336,7 +25337,7 @@
               </a:ln>
               <a:extLst>
                 <a:ext uri="{91240B29-F687-4f45-9708-019B960494DF}">
-                  <a14:hiddenLine xmlns:a14="http://schemas.microsoft.com/office/drawing/2010/main" xmlns="" w="9525">
+                  <a14:hiddenLine xmlns="" xmlns:a14="http://schemas.microsoft.com/office/drawing/2010/main" w="9525">
                     <a:solidFill>
                       <a:srgbClr val="000000"/>
                     </a:solidFill>
@@ -25404,7 +25405,7 @@
               </a:ln>
               <a:extLst>
                 <a:ext uri="{91240B29-F687-4f45-9708-019B960494DF}">
-                  <a14:hiddenLine xmlns:a14="http://schemas.microsoft.com/office/drawing/2010/main" xmlns="" w="9525">
+                  <a14:hiddenLine xmlns="" xmlns:a14="http://schemas.microsoft.com/office/drawing/2010/main" w="9525">
                     <a:solidFill>
                       <a:srgbClr val="000000"/>
                     </a:solidFill>
@@ -25494,7 +25495,7 @@
               </a:ln>
               <a:extLst>
                 <a:ext uri="{91240B29-F687-4f45-9708-019B960494DF}">
-                  <a14:hiddenLine xmlns:a14="http://schemas.microsoft.com/office/drawing/2010/main" xmlns="" w="9525">
+                  <a14:hiddenLine xmlns="" xmlns:a14="http://schemas.microsoft.com/office/drawing/2010/main" w="9525">
                     <a:solidFill>
                       <a:srgbClr val="000000"/>
                     </a:solidFill>
@@ -25528,7 +25529,7 @@
               </a:ln>
               <a:extLst>
                 <a:ext uri="{91240B29-F687-4f45-9708-019B960494DF}">
-                  <a14:hiddenLine xmlns:a14="http://schemas.microsoft.com/office/drawing/2010/main" xmlns="" w="9525">
+                  <a14:hiddenLine xmlns="" xmlns:a14="http://schemas.microsoft.com/office/drawing/2010/main" w="9525">
                     <a:solidFill>
                       <a:srgbClr val="000000"/>
                     </a:solidFill>
@@ -25667,7 +25668,7 @@
           <a:p>
             <a:fld id="{3CBC1C18-307B-4F68-A007-B5B542270E8D}" type="datetimeFigureOut">
               <a:rPr lang="en-US" smtClean="0"/>
-              <a:t>2023-12-03</a:t>
+              <a:t>2023-12-04</a:t>
             </a:fld>
             <a:endParaRPr lang="en-US"/>
           </a:p>
@@ -25783,13 +25784,13 @@
     <p:sldLayoutId id="2147485049" r:id="rId16"/>
     <p:sldLayoutId id="2147485050" r:id="rId17"/>
   </p:sldLayoutIdLst>
-  <mc:AlternateContent xmlns:mc="http://schemas.openxmlformats.org/markup-compatibility/2006">
-    <mc:Choice xmlns:p159="http://schemas.microsoft.com/office/powerpoint/2015/09/main" Requires="p159">
+  <mc:AlternateContent xmlns:mc="http://schemas.openxmlformats.org/markup-compatibility/2006" xmlns:p159="http://schemas.microsoft.com/office/powerpoint/2015/09/main">
+    <mc:Choice Requires="p159">
       <p:transition spd="slow">
         <p159:morph option="byObject"/>
       </p:transition>
     </mc:Choice>
-    <mc:Fallback>
+    <mc:Fallback xmlns="">
       <p:transition spd="slow">
         <p:fade/>
       </p:transition>
@@ -26164,8 +26165,8 @@
         </p:nvSpPr>
         <p:spPr>
           <a:xfrm>
-            <a:off x="6916566" y="3971926"/>
-            <a:ext cx="3751433" cy="646331"/>
+            <a:off x="6096000" y="3971926"/>
+            <a:ext cx="4571999" cy="1477328"/>
           </a:xfrm>
           <a:prstGeom prst="rect">
             <a:avLst/>
@@ -26180,7 +26181,7 @@
           <a:p>
             <a:pPr algn="r"/>
             <a:r>
-              <a:rPr lang="en-US" b="1">
+              <a:rPr lang="en-US" b="1" dirty="0">
                 <a:latin typeface="SF Pro Text" pitchFamily="50" charset="0"/>
                 <a:ea typeface="SF Pro Text" pitchFamily="50" charset="0"/>
                 <a:cs typeface="SF Pro Text" pitchFamily="50" charset="0"/>
@@ -26191,14 +26192,55 @@
           <a:p>
             <a:pPr algn="r"/>
             <a:r>
-              <a:rPr lang="en-US" i="1">
+              <a:rPr lang="en-US" i="1" dirty="0">
                 <a:latin typeface="SF Pro Text" pitchFamily="50" charset="0"/>
                 <a:ea typeface="SF Pro Text" pitchFamily="50" charset="0"/>
                 <a:cs typeface="SF Pro Text" pitchFamily="50" charset="0"/>
               </a:rPr>
               <a:t>Dr. Anuradha Laishram</a:t>
             </a:r>
-            <a:endParaRPr lang="en-IN" i="1">
+          </a:p>
+          <a:p>
+            <a:pPr algn="r"/>
+            <a:endParaRPr lang="en-US" i="1" dirty="0">
+              <a:latin typeface="SF Pro Text" pitchFamily="50" charset="0"/>
+              <a:ea typeface="SF Pro Text" pitchFamily="50" charset="0"/>
+              <a:cs typeface="SF Pro Text" pitchFamily="50" charset="0"/>
+            </a:endParaRPr>
+          </a:p>
+          <a:p>
+            <a:pPr algn="r"/>
+            <a:r>
+              <a:rPr lang="en-US" sz="1200" dirty="0">
+                <a:latin typeface="SF Pro Text" pitchFamily="50" charset="0"/>
+                <a:ea typeface="SF Pro Text" pitchFamily="50" charset="0"/>
+                <a:cs typeface="SF Pro Text" pitchFamily="50" charset="0"/>
+              </a:rPr>
+              <a:t>Assistant Professor</a:t>
+            </a:r>
+          </a:p>
+          <a:p>
+            <a:pPr algn="r"/>
+            <a:r>
+              <a:rPr lang="en-US" sz="1200" dirty="0">
+                <a:latin typeface="SF Pro Text" pitchFamily="50" charset="0"/>
+                <a:ea typeface="SF Pro Text" pitchFamily="50" charset="0"/>
+                <a:cs typeface="SF Pro Text" pitchFamily="50" charset="0"/>
+              </a:rPr>
+              <a:t>Department of Computer Science and Engineering</a:t>
+            </a:r>
+          </a:p>
+          <a:p>
+            <a:pPr algn="r"/>
+            <a:r>
+              <a:rPr lang="en-US" sz="1200" dirty="0">
+                <a:latin typeface="SF Pro Text" pitchFamily="50" charset="0"/>
+                <a:ea typeface="SF Pro Text" pitchFamily="50" charset="0"/>
+                <a:cs typeface="SF Pro Text" pitchFamily="50" charset="0"/>
+              </a:rPr>
+              <a:t>National Institute of Technology, Manipur</a:t>
+            </a:r>
+            <a:endParaRPr lang="en-IN" sz="1200" dirty="0">
               <a:latin typeface="SF Pro Text" pitchFamily="50" charset="0"/>
               <a:ea typeface="SF Pro Text" pitchFamily="50" charset="0"/>
               <a:cs typeface="SF Pro Text" pitchFamily="50" charset="0"/>
@@ -26220,8 +26262,8 @@
         </p:nvSpPr>
         <p:spPr>
           <a:xfrm>
-            <a:off x="1524001" y="3971926"/>
-            <a:ext cx="3751433" cy="1477328"/>
+            <a:off x="1524000" y="3971926"/>
+            <a:ext cx="4571999" cy="1477328"/>
           </a:xfrm>
           <a:prstGeom prst="rect">
             <a:avLst/>
@@ -26371,13 +26413,13 @@
   <p:clrMapOvr>
     <a:masterClrMapping/>
   </p:clrMapOvr>
-  <mc:AlternateContent xmlns:mc="http://schemas.openxmlformats.org/markup-compatibility/2006">
-    <mc:Choice xmlns:p159="http://schemas.microsoft.com/office/powerpoint/2015/09/main" Requires="p159">
+  <mc:AlternateContent xmlns:mc="http://schemas.openxmlformats.org/markup-compatibility/2006" xmlns:p159="http://schemas.microsoft.com/office/powerpoint/2015/09/main">
+    <mc:Choice Requires="p159">
       <p:transition spd="slow">
         <p159:morph option="byObject"/>
       </p:transition>
     </mc:Choice>
-    <mc:Fallback>
+    <mc:Fallback xmlns="">
       <p:transition spd="slow">
         <p:fade/>
       </p:transition>
@@ -26387,6 +26429,228 @@
 </file>
 
 <file path=ppt/slides/slide10.xml><?xml version="1.0" encoding="utf-8"?>
+<p:sld xmlns:a="http://schemas.openxmlformats.org/drawingml/2006/main" xmlns:r="http://schemas.openxmlformats.org/officeDocument/2006/relationships" xmlns:p="http://schemas.openxmlformats.org/presentationml/2006/main">
+  <p:cSld>
+    <p:spTree>
+      <p:nvGrpSpPr>
+        <p:cNvPr id="1" name=""/>
+        <p:cNvGrpSpPr/>
+        <p:nvPr/>
+      </p:nvGrpSpPr>
+      <p:grpSpPr>
+        <a:xfrm>
+          <a:off x="0" y="0"/>
+          <a:ext cx="0" cy="0"/>
+          <a:chOff x="0" y="0"/>
+          <a:chExt cx="0" cy="0"/>
+        </a:xfrm>
+      </p:grpSpPr>
+      <p:sp>
+        <p:nvSpPr>
+          <p:cNvPr id="2" name="Title 1">
+            <a:extLst>
+              <a:ext uri="{FF2B5EF4-FFF2-40B4-BE49-F238E27FC236}">
+                <a16:creationId xmlns:a16="http://schemas.microsoft.com/office/drawing/2014/main" id="{231062AF-BF9B-E224-9639-1CCA78408212}"/>
+              </a:ext>
+            </a:extLst>
+          </p:cNvPr>
+          <p:cNvSpPr>
+            <a:spLocks noGrp="1"/>
+          </p:cNvSpPr>
+          <p:nvPr>
+            <p:ph type="title"/>
+          </p:nvPr>
+        </p:nvSpPr>
+        <p:spPr>
+          <a:xfrm>
+            <a:off x="1141413" y="618518"/>
+            <a:ext cx="9905998" cy="1478570"/>
+          </a:xfrm>
+        </p:spPr>
+        <p:txBody>
+          <a:bodyPr/>
+          <a:lstStyle/>
+          <a:p>
+            <a:pPr algn="ctr"/>
+            <a:r>
+              <a:rPr lang="en-US" b="1">
+                <a:latin typeface="SF Pro Display" pitchFamily="50" charset="0"/>
+                <a:ea typeface="SF Pro Display" pitchFamily="50" charset="0"/>
+                <a:cs typeface="SF Pro Display" pitchFamily="50" charset="0"/>
+              </a:rPr>
+              <a:t>Software Requirements</a:t>
+            </a:r>
+            <a:endParaRPr lang="en-IN" b="1">
+              <a:latin typeface="SF Pro Display" pitchFamily="50" charset="0"/>
+              <a:ea typeface="SF Pro Display" pitchFamily="50" charset="0"/>
+              <a:cs typeface="SF Pro Display" pitchFamily="50" charset="0"/>
+            </a:endParaRPr>
+          </a:p>
+        </p:txBody>
+      </p:sp>
+      <p:sp>
+        <p:nvSpPr>
+          <p:cNvPr id="3" name="Content Placeholder 2">
+            <a:extLst>
+              <a:ext uri="{FF2B5EF4-FFF2-40B4-BE49-F238E27FC236}">
+                <a16:creationId xmlns:a16="http://schemas.microsoft.com/office/drawing/2014/main" id="{1FC9C90F-EC6A-7FA2-83CA-CA2E52D3A922}"/>
+              </a:ext>
+            </a:extLst>
+          </p:cNvPr>
+          <p:cNvSpPr>
+            <a:spLocks noGrp="1"/>
+          </p:cNvSpPr>
+          <p:nvPr>
+            <p:ph idx="1"/>
+          </p:nvPr>
+        </p:nvSpPr>
+        <p:spPr>
+          <a:xfrm>
+            <a:off x="1141412" y="2249487"/>
+            <a:ext cx="9905999" cy="3541714"/>
+          </a:xfrm>
+        </p:spPr>
+        <p:txBody>
+          <a:bodyPr anchor="t">
+            <a:noAutofit/>
+          </a:bodyPr>
+          <a:lstStyle/>
+          <a:p>
+            <a:r>
+              <a:rPr lang="en-US" sz="2800" dirty="0">
+                <a:latin typeface="SF Pro Text" pitchFamily="50" charset="0"/>
+                <a:ea typeface="SF Pro Text" pitchFamily="50" charset="0"/>
+                <a:cs typeface="SF Pro Text" pitchFamily="50" charset="0"/>
+              </a:rPr>
+              <a:t>P</a:t>
+            </a:r>
+            <a:r>
+              <a:rPr lang="en-IN" sz="2800" dirty="0" err="1">
+                <a:latin typeface="SF Pro Text" pitchFamily="50" charset="0"/>
+                <a:ea typeface="SF Pro Text" pitchFamily="50" charset="0"/>
+                <a:cs typeface="SF Pro Text" pitchFamily="50" charset="0"/>
+              </a:rPr>
+              <a:t>ython</a:t>
+            </a:r>
+            <a:r>
+              <a:rPr lang="en-IN" sz="2800" dirty="0">
+                <a:latin typeface="SF Pro Text" pitchFamily="50" charset="0"/>
+                <a:ea typeface="SF Pro Text" pitchFamily="50" charset="0"/>
+                <a:cs typeface="SF Pro Text" pitchFamily="50" charset="0"/>
+              </a:rPr>
+              <a:t>@^v3.12.0</a:t>
+            </a:r>
+          </a:p>
+          <a:p>
+            <a:r>
+              <a:rPr lang="en-IN" sz="2800" dirty="0">
+                <a:latin typeface="SF Pro Text" pitchFamily="50" charset="0"/>
+                <a:ea typeface="SF Pro Text" pitchFamily="50" charset="0"/>
+                <a:cs typeface="SF Pro Text" pitchFamily="50" charset="0"/>
+              </a:rPr>
+              <a:t>Tesseract-OCR@^v5.3.3</a:t>
+            </a:r>
+          </a:p>
+          <a:p>
+            <a:r>
+              <a:rPr lang="en-IN" sz="2800" dirty="0" err="1">
+                <a:latin typeface="SF Pro Text" pitchFamily="50" charset="0"/>
+                <a:ea typeface="SF Pro Text" pitchFamily="50" charset="0"/>
+                <a:cs typeface="SF Pro Text" pitchFamily="50" charset="0"/>
+              </a:rPr>
+              <a:t>pytesseract</a:t>
+            </a:r>
+            <a:r>
+              <a:rPr lang="en-IN" sz="2800" dirty="0">
+                <a:latin typeface="SF Pro Text" pitchFamily="50" charset="0"/>
+                <a:ea typeface="SF Pro Text" pitchFamily="50" charset="0"/>
+                <a:cs typeface="SF Pro Text" pitchFamily="50" charset="0"/>
+              </a:rPr>
+              <a:t>@^v0.3.10</a:t>
+            </a:r>
+          </a:p>
+          <a:p>
+            <a:r>
+              <a:rPr lang="en-IN" sz="2800" dirty="0" err="1">
+                <a:latin typeface="SF Pro Text" pitchFamily="50" charset="0"/>
+                <a:ea typeface="SF Pro Text" pitchFamily="50" charset="0"/>
+                <a:cs typeface="SF Pro Text" pitchFamily="50" charset="0"/>
+              </a:rPr>
+              <a:t>gTTS</a:t>
+            </a:r>
+            <a:r>
+              <a:rPr lang="en-IN" sz="2800" dirty="0">
+                <a:latin typeface="SF Pro Text" pitchFamily="50" charset="0"/>
+                <a:ea typeface="SF Pro Text" pitchFamily="50" charset="0"/>
+                <a:cs typeface="SF Pro Text" pitchFamily="50" charset="0"/>
+              </a:rPr>
+              <a:t>@^v2.4.0</a:t>
+            </a:r>
+          </a:p>
+          <a:p>
+            <a:r>
+              <a:rPr lang="en-IN" sz="2800" dirty="0" err="1">
+                <a:latin typeface="SF Pro Text" pitchFamily="50" charset="0"/>
+                <a:ea typeface="SF Pro Text" pitchFamily="50" charset="0"/>
+                <a:cs typeface="SF Pro Text" pitchFamily="50" charset="0"/>
+              </a:rPr>
+              <a:t>sounddevice</a:t>
+            </a:r>
+            <a:r>
+              <a:rPr lang="en-IN" sz="2800" dirty="0">
+                <a:latin typeface="SF Pro Text" pitchFamily="50" charset="0"/>
+                <a:ea typeface="SF Pro Text" pitchFamily="50" charset="0"/>
+                <a:cs typeface="SF Pro Text" pitchFamily="50" charset="0"/>
+              </a:rPr>
+              <a:t>@^v0.4.6</a:t>
+            </a:r>
+          </a:p>
+          <a:p>
+            <a:r>
+              <a:rPr lang="en-IN" sz="2800" dirty="0" err="1">
+                <a:latin typeface="SF Pro Text" pitchFamily="50" charset="0"/>
+                <a:ea typeface="SF Pro Text" pitchFamily="50" charset="0"/>
+                <a:cs typeface="SF Pro Text" pitchFamily="50" charset="0"/>
+              </a:rPr>
+              <a:t>soundfile</a:t>
+            </a:r>
+            <a:r>
+              <a:rPr lang="en-IN" sz="2800" dirty="0">
+                <a:latin typeface="SF Pro Text" pitchFamily="50" charset="0"/>
+                <a:ea typeface="SF Pro Text" pitchFamily="50" charset="0"/>
+                <a:cs typeface="SF Pro Text" pitchFamily="50" charset="0"/>
+              </a:rPr>
+              <a:t>@^v0.12.1</a:t>
+            </a:r>
+          </a:p>
+        </p:txBody>
+      </p:sp>
+    </p:spTree>
+    <p:extLst>
+      <p:ext uri="{BB962C8B-B14F-4D97-AF65-F5344CB8AC3E}">
+        <p14:creationId xmlns:p14="http://schemas.microsoft.com/office/powerpoint/2010/main" val="3062701205"/>
+      </p:ext>
+    </p:extLst>
+  </p:cSld>
+  <p:clrMapOvr>
+    <a:masterClrMapping/>
+  </p:clrMapOvr>
+  <mc:AlternateContent xmlns:mc="http://schemas.openxmlformats.org/markup-compatibility/2006" xmlns:p159="http://schemas.microsoft.com/office/powerpoint/2015/09/main">
+    <mc:Choice Requires="p159">
+      <p:transition spd="slow">
+        <p159:morph option="byObject"/>
+      </p:transition>
+    </mc:Choice>
+    <mc:Fallback xmlns="">
+      <p:transition spd="slow">
+        <p:fade/>
+      </p:transition>
+    </mc:Fallback>
+  </mc:AlternateContent>
+</p:sld>
+</file>
+
+<file path=ppt/slides/slide11.xml><?xml version="1.0" encoding="utf-8"?>
 <p:sld xmlns:a="http://schemas.openxmlformats.org/drawingml/2006/main" xmlns:r="http://schemas.openxmlformats.org/officeDocument/2006/relationships" xmlns:p="http://schemas.openxmlformats.org/presentationml/2006/main">
   <p:cSld>
     <p:spTree>
@@ -26600,13 +26864,13 @@
   <p:clrMapOvr>
     <a:masterClrMapping/>
   </p:clrMapOvr>
-  <mc:AlternateContent xmlns:mc="http://schemas.openxmlformats.org/markup-compatibility/2006">
-    <mc:Choice xmlns:p159="http://schemas.microsoft.com/office/powerpoint/2015/09/main" Requires="p159">
+  <mc:AlternateContent xmlns:mc="http://schemas.openxmlformats.org/markup-compatibility/2006" xmlns:p159="http://schemas.microsoft.com/office/powerpoint/2015/09/main">
+    <mc:Choice Requires="p159">
       <p:transition spd="slow">
         <p159:morph option="byObject"/>
       </p:transition>
     </mc:Choice>
-    <mc:Fallback>
+    <mc:Fallback xmlns="">
       <p:transition spd="slow">
         <p:fade/>
       </p:transition>
@@ -26615,7 +26879,7 @@
 </p:sld>
 </file>
 
-<file path=ppt/slides/slide11.xml><?xml version="1.0" encoding="utf-8"?>
+<file path=ppt/slides/slide12.xml><?xml version="1.0" encoding="utf-8"?>
 <p:sld xmlns:a="http://schemas.openxmlformats.org/drawingml/2006/main" xmlns:r="http://schemas.openxmlformats.org/officeDocument/2006/relationships" xmlns:p="http://schemas.openxmlformats.org/presentationml/2006/main">
   <p:cSld>
     <p:spTree>
@@ -27269,13 +27533,13 @@
   <p:clrMapOvr>
     <a:masterClrMapping/>
   </p:clrMapOvr>
-  <mc:AlternateContent xmlns:mc="http://schemas.openxmlformats.org/markup-compatibility/2006">
-    <mc:Choice xmlns:p159="http://schemas.microsoft.com/office/powerpoint/2015/09/main" Requires="p159">
+  <mc:AlternateContent xmlns:mc="http://schemas.openxmlformats.org/markup-compatibility/2006" xmlns:p159="http://schemas.microsoft.com/office/powerpoint/2015/09/main">
+    <mc:Choice Requires="p159">
       <p:transition spd="slow">
         <p159:morph option="byObject"/>
       </p:transition>
     </mc:Choice>
-    <mc:Fallback>
+    <mc:Fallback xmlns="">
       <p:transition spd="slow">
         <p:fade/>
       </p:transition>
@@ -27284,7 +27548,7 @@
 </p:sld>
 </file>
 
-<file path=ppt/slides/slide12.xml><?xml version="1.0" encoding="utf-8"?>
+<file path=ppt/slides/slide13.xml><?xml version="1.0" encoding="utf-8"?>
 <p:sld xmlns:a="http://schemas.openxmlformats.org/drawingml/2006/main" xmlns:r="http://schemas.openxmlformats.org/officeDocument/2006/relationships" xmlns:p="http://schemas.openxmlformats.org/presentationml/2006/main">
   <p:cSld>
     <p:spTree>
@@ -27466,13 +27730,13 @@
   <p:clrMapOvr>
     <a:masterClrMapping/>
   </p:clrMapOvr>
-  <mc:AlternateContent xmlns:mc="http://schemas.openxmlformats.org/markup-compatibility/2006">
-    <mc:Choice xmlns:p159="http://schemas.microsoft.com/office/powerpoint/2015/09/main" Requires="p159">
+  <mc:AlternateContent xmlns:mc="http://schemas.openxmlformats.org/markup-compatibility/2006" xmlns:p159="http://schemas.microsoft.com/office/powerpoint/2015/09/main">
+    <mc:Choice Requires="p159">
       <p:transition spd="slow">
         <p159:morph option="byObject"/>
       </p:transition>
     </mc:Choice>
-    <mc:Fallback>
+    <mc:Fallback xmlns="">
       <p:transition spd="slow">
         <p:fade/>
       </p:transition>
@@ -27481,7 +27745,7 @@
 </p:sld>
 </file>
 
-<file path=ppt/slides/slide13.xml><?xml version="1.0" encoding="utf-8"?>
+<file path=ppt/slides/slide14.xml><?xml version="1.0" encoding="utf-8"?>
 <p:sld xmlns:a="http://schemas.openxmlformats.org/drawingml/2006/main" xmlns:r="http://schemas.openxmlformats.org/officeDocument/2006/relationships" xmlns:p="http://schemas.openxmlformats.org/presentationml/2006/main">
   <p:cSld>
     <p:spTree>
@@ -27577,13 +27841,13 @@
   <p:clrMapOvr>
     <a:masterClrMapping/>
   </p:clrMapOvr>
-  <mc:AlternateContent xmlns:mc="http://schemas.openxmlformats.org/markup-compatibility/2006">
-    <mc:Choice xmlns:p159="http://schemas.microsoft.com/office/powerpoint/2015/09/main" Requires="p159">
+  <mc:AlternateContent xmlns:mc="http://schemas.openxmlformats.org/markup-compatibility/2006" xmlns:p159="http://schemas.microsoft.com/office/powerpoint/2015/09/main">
+    <mc:Choice Requires="p159">
       <p:transition spd="slow">
         <p159:morph option="byObject"/>
       </p:transition>
     </mc:Choice>
-    <mc:Fallback>
+    <mc:Fallback xmlns="">
       <p:transition spd="slow">
         <p:fade/>
       </p:transition>
@@ -27592,7 +27856,7 @@
 </p:sld>
 </file>
 
-<file path=ppt/slides/slide14.xml><?xml version="1.0" encoding="utf-8"?>
+<file path=ppt/slides/slide15.xml><?xml version="1.0" encoding="utf-8"?>
 <p:sld xmlns:a="http://schemas.openxmlformats.org/drawingml/2006/main" xmlns:r="http://schemas.openxmlformats.org/officeDocument/2006/relationships" xmlns:p="http://schemas.openxmlformats.org/presentationml/2006/main">
   <p:cSld>
     <p:spTree>
@@ -27709,13 +27973,13 @@
   <p:clrMapOvr>
     <a:masterClrMapping/>
   </p:clrMapOvr>
-  <mc:AlternateContent xmlns:mc="http://schemas.openxmlformats.org/markup-compatibility/2006">
-    <mc:Choice xmlns:p159="http://schemas.microsoft.com/office/powerpoint/2015/09/main" Requires="p159">
+  <mc:AlternateContent xmlns:mc="http://schemas.openxmlformats.org/markup-compatibility/2006" xmlns:p159="http://schemas.microsoft.com/office/powerpoint/2015/09/main">
+    <mc:Choice Requires="p159">
       <p:transition spd="slow">
         <p159:morph option="byObject"/>
       </p:transition>
     </mc:Choice>
-    <mc:Fallback>
+    <mc:Fallback xmlns="">
       <p:transition spd="slow">
         <p:fade/>
       </p:transition>
@@ -27724,7 +27988,7 @@
 </p:sld>
 </file>
 
-<file path=ppt/slides/slide15.xml><?xml version="1.0" encoding="utf-8"?>
+<file path=ppt/slides/slide16.xml><?xml version="1.0" encoding="utf-8"?>
 <p:sld xmlns:a="http://schemas.openxmlformats.org/drawingml/2006/main" xmlns:r="http://schemas.openxmlformats.org/officeDocument/2006/relationships" xmlns:p="http://schemas.openxmlformats.org/presentationml/2006/main">
   <p:cSld>
     <p:spTree>
@@ -27796,13 +28060,13 @@
   <p:clrMapOvr>
     <a:masterClrMapping/>
   </p:clrMapOvr>
-  <mc:AlternateContent xmlns:mc="http://schemas.openxmlformats.org/markup-compatibility/2006">
-    <mc:Choice xmlns:p159="http://schemas.microsoft.com/office/powerpoint/2015/09/main" Requires="p159">
+  <mc:AlternateContent xmlns:mc="http://schemas.openxmlformats.org/markup-compatibility/2006" xmlns:p159="http://schemas.microsoft.com/office/powerpoint/2015/09/main">
+    <mc:Choice Requires="p159">
       <p:transition spd="slow">
         <p159:morph option="byObject"/>
       </p:transition>
     </mc:Choice>
-    <mc:Fallback>
+    <mc:Fallback xmlns="">
       <p:transition spd="slow">
         <p:fade/>
       </p:transition>
@@ -27906,7 +28170,7 @@
               <a:buAutoNum type="arabicPeriod"/>
             </a:pPr>
             <a:r>
-              <a:rPr lang="en-US" sz="1400">
+              <a:rPr lang="en-US" sz="1400" dirty="0">
                 <a:latin typeface="SF Pro Text" pitchFamily="50" charset="0"/>
                 <a:ea typeface="SF Pro Text" pitchFamily="50" charset="0"/>
                 <a:cs typeface="SF Pro Text" pitchFamily="50" charset="0"/>
@@ -27920,7 +28184,7 @@
               <a:buAutoNum type="arabicPeriod"/>
             </a:pPr>
             <a:r>
-              <a:rPr lang="en-US" sz="1400">
+              <a:rPr lang="en-US" sz="1400" dirty="0">
                 <a:latin typeface="SF Pro Text" pitchFamily="50" charset="0"/>
                 <a:ea typeface="SF Pro Text" pitchFamily="50" charset="0"/>
                 <a:cs typeface="SF Pro Text" pitchFamily="50" charset="0"/>
@@ -27934,7 +28198,21 @@
               <a:buAutoNum type="arabicPeriod"/>
             </a:pPr>
             <a:r>
-              <a:rPr lang="en-US" sz="1400">
+              <a:rPr lang="en-US" sz="1400" dirty="0">
+                <a:latin typeface="SF Pro Text" pitchFamily="50" charset="0"/>
+                <a:ea typeface="SF Pro Text" pitchFamily="50" charset="0"/>
+                <a:cs typeface="SF Pro Text" pitchFamily="50" charset="0"/>
+              </a:rPr>
+              <a:t>Sample Dataset</a:t>
+            </a:r>
+          </a:p>
+          <a:p>
+            <a:pPr marL="457200" indent="-457200">
+              <a:buFont typeface="+mj-lt"/>
+              <a:buAutoNum type="arabicPeriod"/>
+            </a:pPr>
+            <a:r>
+              <a:rPr lang="en-US" sz="1400" dirty="0">
                 <a:latin typeface="SF Pro Text" pitchFamily="50" charset="0"/>
                 <a:ea typeface="SF Pro Text" pitchFamily="50" charset="0"/>
                 <a:cs typeface="SF Pro Text" pitchFamily="50" charset="0"/>
@@ -27948,7 +28226,7 @@
               <a:buAutoNum type="arabicPeriod"/>
             </a:pPr>
             <a:r>
-              <a:rPr lang="en-IN" sz="1400">
+              <a:rPr lang="en-IN" sz="1400" dirty="0">
                 <a:latin typeface="SF Pro Text" pitchFamily="50" charset="0"/>
                 <a:ea typeface="SF Pro Text" pitchFamily="50" charset="0"/>
                 <a:cs typeface="SF Pro Text" pitchFamily="50" charset="0"/>
@@ -27962,7 +28240,7 @@
               <a:buAutoNum type="arabicPeriod"/>
             </a:pPr>
             <a:r>
-              <a:rPr lang="en-IN" sz="1400">
+              <a:rPr lang="en-IN" sz="1400" dirty="0">
                 <a:latin typeface="SF Pro Text" pitchFamily="50" charset="0"/>
                 <a:ea typeface="SF Pro Text" pitchFamily="50" charset="0"/>
                 <a:cs typeface="SF Pro Text" pitchFamily="50" charset="0"/>
@@ -27976,7 +28254,7 @@
               <a:buAutoNum type="arabicPeriod"/>
             </a:pPr>
             <a:r>
-              <a:rPr lang="en-IN" sz="1400">
+              <a:rPr lang="en-IN" sz="1400" dirty="0">
                 <a:latin typeface="SF Pro Text" pitchFamily="50" charset="0"/>
                 <a:ea typeface="SF Pro Text" pitchFamily="50" charset="0"/>
                 <a:cs typeface="SF Pro Text" pitchFamily="50" charset="0"/>
@@ -27990,7 +28268,7 @@
               <a:buAutoNum type="arabicPeriod"/>
             </a:pPr>
             <a:r>
-              <a:rPr lang="en-US" sz="1400">
+              <a:rPr lang="en-US" sz="1400" dirty="0">
                 <a:latin typeface="SF Pro Text" pitchFamily="50" charset="0"/>
                 <a:ea typeface="SF Pro Text" pitchFamily="50" charset="0"/>
                 <a:cs typeface="SF Pro Text" pitchFamily="50" charset="0"/>
@@ -28004,7 +28282,7 @@
               <a:buAutoNum type="arabicPeriod"/>
             </a:pPr>
             <a:r>
-              <a:rPr lang="en-US" sz="1400">
+              <a:rPr lang="en-US" sz="1400" dirty="0">
                 <a:latin typeface="SF Pro Text" pitchFamily="50" charset="0"/>
                 <a:ea typeface="SF Pro Text" pitchFamily="50" charset="0"/>
                 <a:cs typeface="SF Pro Text" pitchFamily="50" charset="0"/>
@@ -28018,7 +28296,7 @@
               <a:buAutoNum type="arabicPeriod"/>
             </a:pPr>
             <a:r>
-              <a:rPr lang="en-US" sz="1400">
+              <a:rPr lang="en-US" sz="1400" dirty="0">
                 <a:latin typeface="SF Pro Text" pitchFamily="50" charset="0"/>
                 <a:ea typeface="SF Pro Text" pitchFamily="50" charset="0"/>
                 <a:cs typeface="SF Pro Text" pitchFamily="50" charset="0"/>
@@ -28032,7 +28310,7 @@
               <a:buAutoNum type="arabicPeriod"/>
             </a:pPr>
             <a:r>
-              <a:rPr lang="en-US" sz="1400">
+              <a:rPr lang="en-US" sz="1400" dirty="0">
                 <a:latin typeface="SF Pro Text" pitchFamily="50" charset="0"/>
                 <a:ea typeface="SF Pro Text" pitchFamily="50" charset="0"/>
                 <a:cs typeface="SF Pro Text" pitchFamily="50" charset="0"/>
@@ -28052,13 +28330,13 @@
   <p:clrMapOvr>
     <a:masterClrMapping/>
   </p:clrMapOvr>
-  <mc:AlternateContent xmlns:mc="http://schemas.openxmlformats.org/markup-compatibility/2006">
-    <mc:Choice xmlns:p159="http://schemas.microsoft.com/office/powerpoint/2015/09/main" Requires="p159">
+  <mc:AlternateContent xmlns:mc="http://schemas.openxmlformats.org/markup-compatibility/2006" xmlns:p159="http://schemas.microsoft.com/office/powerpoint/2015/09/main">
+    <mc:Choice Requires="p159">
       <p:transition spd="slow">
         <p159:morph option="byObject"/>
       </p:transition>
     </mc:Choice>
-    <mc:Fallback>
+    <mc:Fallback xmlns="">
       <p:transition spd="slow">
         <p:fade/>
       </p:transition>
@@ -28213,13 +28491,13 @@
   <p:clrMapOvr>
     <a:masterClrMapping/>
   </p:clrMapOvr>
-  <mc:AlternateContent xmlns:mc="http://schemas.openxmlformats.org/markup-compatibility/2006">
-    <mc:Choice xmlns:p159="http://schemas.microsoft.com/office/powerpoint/2015/09/main" Requires="p159">
+  <mc:AlternateContent xmlns:mc="http://schemas.openxmlformats.org/markup-compatibility/2006" xmlns:p159="http://schemas.microsoft.com/office/powerpoint/2015/09/main">
+    <mc:Choice Requires="p159">
       <p:transition spd="slow">
         <p159:morph option="byObject"/>
       </p:transition>
     </mc:Choice>
-    <mc:Fallback>
+    <mc:Fallback xmlns="">
       <p:transition spd="slow">
         <p:fade/>
       </p:transition>
@@ -28395,13 +28673,13 @@
   <p:clrMapOvr>
     <a:masterClrMapping/>
   </p:clrMapOvr>
-  <mc:AlternateContent xmlns:mc="http://schemas.openxmlformats.org/markup-compatibility/2006">
-    <mc:Choice xmlns:p159="http://schemas.microsoft.com/office/powerpoint/2015/09/main" Requires="p159">
+  <mc:AlternateContent xmlns:mc="http://schemas.openxmlformats.org/markup-compatibility/2006" xmlns:p159="http://schemas.microsoft.com/office/powerpoint/2015/09/main">
+    <mc:Choice Requires="p159">
       <p:transition spd="slow">
         <p159:morph option="byObject"/>
       </p:transition>
     </mc:Choice>
-    <mc:Fallback>
+    <mc:Fallback xmlns="">
       <p:transition spd="slow">
         <p:fade/>
       </p:transition>
@@ -28411,6 +28689,276 @@
 </file>
 
 <file path=ppt/slides/slide5.xml><?xml version="1.0" encoding="utf-8"?>
+<p:sld xmlns:a="http://schemas.openxmlformats.org/drawingml/2006/main" xmlns:r="http://schemas.openxmlformats.org/officeDocument/2006/relationships" xmlns:p="http://schemas.openxmlformats.org/presentationml/2006/main">
+  <p:cSld>
+    <p:spTree>
+      <p:nvGrpSpPr>
+        <p:cNvPr id="1" name=""/>
+        <p:cNvGrpSpPr/>
+        <p:nvPr/>
+      </p:nvGrpSpPr>
+      <p:grpSpPr>
+        <a:xfrm>
+          <a:off x="0" y="0"/>
+          <a:ext cx="0" cy="0"/>
+          <a:chOff x="0" y="0"/>
+          <a:chExt cx="0" cy="0"/>
+        </a:xfrm>
+      </p:grpSpPr>
+      <p:sp>
+        <p:nvSpPr>
+          <p:cNvPr id="2" name="Title 1">
+            <a:extLst>
+              <a:ext uri="{FF2B5EF4-FFF2-40B4-BE49-F238E27FC236}">
+                <a16:creationId xmlns:a16="http://schemas.microsoft.com/office/drawing/2014/main" id="{CC51AC60-448F-90A4-A2E4-343C58F75F04}"/>
+              </a:ext>
+            </a:extLst>
+          </p:cNvPr>
+          <p:cNvSpPr>
+            <a:spLocks noGrp="1"/>
+          </p:cNvSpPr>
+          <p:nvPr>
+            <p:ph type="title"/>
+          </p:nvPr>
+        </p:nvSpPr>
+        <p:spPr/>
+        <p:txBody>
+          <a:bodyPr/>
+          <a:lstStyle/>
+          <a:p>
+            <a:pPr algn="ctr"/>
+            <a:r>
+              <a:rPr lang="en-US" b="1" dirty="0">
+                <a:latin typeface="SF Pro Display" pitchFamily="50" charset="0"/>
+                <a:ea typeface="SF Pro Display" pitchFamily="50" charset="0"/>
+                <a:cs typeface="SF Pro Display" pitchFamily="50" charset="0"/>
+              </a:rPr>
+              <a:t>Sample Dataset</a:t>
+            </a:r>
+            <a:endParaRPr lang="en-IN" b="1" dirty="0">
+              <a:latin typeface="SF Pro Display" pitchFamily="50" charset="0"/>
+              <a:ea typeface="SF Pro Display" pitchFamily="50" charset="0"/>
+              <a:cs typeface="SF Pro Display" pitchFamily="50" charset="0"/>
+            </a:endParaRPr>
+          </a:p>
+        </p:txBody>
+      </p:sp>
+      <p:pic>
+        <p:nvPicPr>
+          <p:cNvPr id="1028" name="Picture 4">
+            <a:extLst>
+              <a:ext uri="{FF2B5EF4-FFF2-40B4-BE49-F238E27FC236}">
+                <a16:creationId xmlns:a16="http://schemas.microsoft.com/office/drawing/2014/main" id="{E4F4201C-52CC-0892-DDD1-5C14F8477879}"/>
+              </a:ext>
+            </a:extLst>
+          </p:cNvPr>
+          <p:cNvPicPr>
+            <a:picLocks noGrp="1" noChangeAspect="1" noChangeArrowheads="1"/>
+          </p:cNvPicPr>
+          <p:nvPr>
+            <p:ph idx="1"/>
+          </p:nvPr>
+        </p:nvPicPr>
+        <p:blipFill>
+          <a:blip r:embed="rId2">
+            <a:extLst>
+              <a:ext uri="{28A0092B-C50C-407E-A947-70E740481C1C}">
+                <a14:useLocalDpi xmlns:a14="http://schemas.microsoft.com/office/drawing/2010/main" val="0"/>
+              </a:ext>
+            </a:extLst>
+          </a:blip>
+          <a:srcRect/>
+          <a:stretch>
+            <a:fillRect/>
+          </a:stretch>
+        </p:blipFill>
+        <p:spPr bwMode="auto">
+          <a:xfrm>
+            <a:off x="771279" y="1965448"/>
+            <a:ext cx="2239596" cy="990207"/>
+          </a:xfrm>
+          <a:prstGeom prst="rect">
+            <a:avLst/>
+          </a:prstGeom>
+          <a:noFill/>
+          <a:extLst>
+            <a:ext uri="{909E8E84-426E-40DD-AFC4-6F175D3DCCD1}">
+              <a14:hiddenFill xmlns:a14="http://schemas.microsoft.com/office/drawing/2010/main">
+                <a:solidFill>
+                  <a:srgbClr val="FFFFFF"/>
+                </a:solidFill>
+              </a14:hiddenFill>
+            </a:ext>
+          </a:extLst>
+        </p:spPr>
+      </p:pic>
+      <p:pic>
+        <p:nvPicPr>
+          <p:cNvPr id="1030" name="Picture 6" descr="a). Telugu text image. | Download Scientific Diagram">
+            <a:extLst>
+              <a:ext uri="{FF2B5EF4-FFF2-40B4-BE49-F238E27FC236}">
+                <a16:creationId xmlns:a16="http://schemas.microsoft.com/office/drawing/2014/main" id="{F7A8AC81-839F-56E0-AC4B-AC5C2FB2282A}"/>
+              </a:ext>
+            </a:extLst>
+          </p:cNvPr>
+          <p:cNvPicPr>
+            <a:picLocks noChangeAspect="1" noChangeArrowheads="1"/>
+          </p:cNvPicPr>
+          <p:nvPr/>
+        </p:nvPicPr>
+        <p:blipFill>
+          <a:blip r:embed="rId3">
+            <a:extLst>
+              <a:ext uri="{28A0092B-C50C-407E-A947-70E740481C1C}">
+                <a14:useLocalDpi xmlns:a14="http://schemas.microsoft.com/office/drawing/2010/main" val="0"/>
+              </a:ext>
+            </a:extLst>
+          </a:blip>
+          <a:srcRect/>
+          <a:stretch>
+            <a:fillRect/>
+          </a:stretch>
+        </p:blipFill>
+        <p:spPr bwMode="auto">
+          <a:xfrm>
+            <a:off x="3381009" y="1965448"/>
+            <a:ext cx="2743240" cy="990207"/>
+          </a:xfrm>
+          <a:prstGeom prst="rect">
+            <a:avLst/>
+          </a:prstGeom>
+          <a:noFill/>
+          <a:extLst>
+            <a:ext uri="{909E8E84-426E-40DD-AFC4-6F175D3DCCD1}">
+              <a14:hiddenFill xmlns:a14="http://schemas.microsoft.com/office/drawing/2010/main">
+                <a:solidFill>
+                  <a:srgbClr val="FFFFFF"/>
+                </a:solidFill>
+              </a14:hiddenFill>
+            </a:ext>
+          </a:extLst>
+        </p:spPr>
+      </p:pic>
+      <p:pic>
+        <p:nvPicPr>
+          <p:cNvPr id="1032" name="Picture 8" descr="Typotheque: High legibility Devanagari, Kannada and Telugu fonts">
+            <a:extLst>
+              <a:ext uri="{FF2B5EF4-FFF2-40B4-BE49-F238E27FC236}">
+                <a16:creationId xmlns:a16="http://schemas.microsoft.com/office/drawing/2014/main" id="{22470483-7FAA-83F5-9565-483F99474187}"/>
+              </a:ext>
+            </a:extLst>
+          </p:cNvPr>
+          <p:cNvPicPr>
+            <a:picLocks noChangeAspect="1" noChangeArrowheads="1"/>
+          </p:cNvPicPr>
+          <p:nvPr/>
+        </p:nvPicPr>
+        <p:blipFill>
+          <a:blip r:embed="rId4">
+            <a:extLst>
+              <a:ext uri="{28A0092B-C50C-407E-A947-70E740481C1C}">
+                <a14:useLocalDpi xmlns:a14="http://schemas.microsoft.com/office/drawing/2010/main" val="0"/>
+              </a:ext>
+            </a:extLst>
+          </a:blip>
+          <a:srcRect/>
+          <a:stretch>
+            <a:fillRect/>
+          </a:stretch>
+        </p:blipFill>
+        <p:spPr bwMode="auto">
+          <a:xfrm>
+            <a:off x="6494383" y="1965448"/>
+            <a:ext cx="4369046" cy="4425455"/>
+          </a:xfrm>
+          <a:prstGeom prst="rect">
+            <a:avLst/>
+          </a:prstGeom>
+          <a:noFill/>
+          <a:extLst>
+            <a:ext uri="{909E8E84-426E-40DD-AFC4-6F175D3DCCD1}">
+              <a14:hiddenFill xmlns:a14="http://schemas.microsoft.com/office/drawing/2010/main">
+                <a:solidFill>
+                  <a:srgbClr val="FFFFFF"/>
+                </a:solidFill>
+              </a14:hiddenFill>
+            </a:ext>
+          </a:extLst>
+        </p:spPr>
+      </p:pic>
+      <p:pic>
+        <p:nvPicPr>
+          <p:cNvPr id="1034" name="Picture 10" descr="Telugu Fonts: South Asian Language Resource Center">
+            <a:extLst>
+              <a:ext uri="{FF2B5EF4-FFF2-40B4-BE49-F238E27FC236}">
+                <a16:creationId xmlns:a16="http://schemas.microsoft.com/office/drawing/2014/main" id="{9BA88760-6357-4FEC-44E0-4440682F2854}"/>
+              </a:ext>
+            </a:extLst>
+          </p:cNvPr>
+          <p:cNvPicPr>
+            <a:picLocks noChangeAspect="1" noChangeArrowheads="1"/>
+          </p:cNvPicPr>
+          <p:nvPr/>
+        </p:nvPicPr>
+        <p:blipFill>
+          <a:blip r:embed="rId5">
+            <a:extLst>
+              <a:ext uri="{28A0092B-C50C-407E-A947-70E740481C1C}">
+                <a14:useLocalDpi xmlns:a14="http://schemas.microsoft.com/office/drawing/2010/main" val="0"/>
+              </a:ext>
+            </a:extLst>
+          </a:blip>
+          <a:srcRect/>
+          <a:stretch>
+            <a:fillRect/>
+          </a:stretch>
+        </p:blipFill>
+        <p:spPr bwMode="auto">
+          <a:xfrm>
+            <a:off x="771279" y="3130923"/>
+            <a:ext cx="5352970" cy="3259980"/>
+          </a:xfrm>
+          <a:prstGeom prst="rect">
+            <a:avLst/>
+          </a:prstGeom>
+          <a:noFill/>
+          <a:extLst>
+            <a:ext uri="{909E8E84-426E-40DD-AFC4-6F175D3DCCD1}">
+              <a14:hiddenFill xmlns:a14="http://schemas.microsoft.com/office/drawing/2010/main">
+                <a:solidFill>
+                  <a:srgbClr val="FFFFFF"/>
+                </a:solidFill>
+              </a14:hiddenFill>
+            </a:ext>
+          </a:extLst>
+        </p:spPr>
+      </p:pic>
+    </p:spTree>
+    <p:extLst>
+      <p:ext uri="{BB962C8B-B14F-4D97-AF65-F5344CB8AC3E}">
+        <p14:creationId xmlns:p14="http://schemas.microsoft.com/office/powerpoint/2010/main" val="2612173912"/>
+      </p:ext>
+    </p:extLst>
+  </p:cSld>
+  <p:clrMapOvr>
+    <a:masterClrMapping/>
+  </p:clrMapOvr>
+  <mc:AlternateContent xmlns:mc="http://schemas.openxmlformats.org/markup-compatibility/2006" xmlns:p159="http://schemas.microsoft.com/office/powerpoint/2015/09/main">
+    <mc:Choice Requires="p159">
+      <p:transition spd="slow">
+        <p159:morph option="byObject"/>
+      </p:transition>
+    </mc:Choice>
+    <mc:Fallback xmlns="">
+      <p:transition spd="slow">
+        <p:fade/>
+      </p:transition>
+    </mc:Fallback>
+  </mc:AlternateContent>
+</p:sld>
+</file>
+
+<file path=ppt/slides/slide6.xml><?xml version="1.0" encoding="utf-8"?>
 <p:sld xmlns:a="http://schemas.openxmlformats.org/drawingml/2006/main" xmlns:r="http://schemas.openxmlformats.org/officeDocument/2006/relationships" xmlns:p="http://schemas.openxmlformats.org/presentationml/2006/main">
   <p:cSld>
     <p:spTree>
@@ -28614,13 +29162,13 @@
   <p:clrMapOvr>
     <a:masterClrMapping/>
   </p:clrMapOvr>
-  <mc:AlternateContent xmlns:mc="http://schemas.openxmlformats.org/markup-compatibility/2006">
-    <mc:Choice xmlns:p159="http://schemas.microsoft.com/office/powerpoint/2015/09/main" Requires="p159">
+  <mc:AlternateContent xmlns:mc="http://schemas.openxmlformats.org/markup-compatibility/2006" xmlns:p159="http://schemas.microsoft.com/office/powerpoint/2015/09/main">
+    <mc:Choice Requires="p159">
       <p:transition spd="slow">
         <p159:morph option="byObject"/>
       </p:transition>
     </mc:Choice>
-    <mc:Fallback>
+    <mc:Fallback xmlns="">
       <p:transition spd="slow">
         <p:fade/>
       </p:transition>
@@ -28629,7 +29177,7 @@
 </p:sld>
 </file>
 
-<file path=ppt/slides/slide6.xml><?xml version="1.0" encoding="utf-8"?>
+<file path=ppt/slides/slide7.xml><?xml version="1.0" encoding="utf-8"?>
 <p:sld xmlns:a="http://schemas.openxmlformats.org/drawingml/2006/main" xmlns:r="http://schemas.openxmlformats.org/officeDocument/2006/relationships" xmlns:p="http://schemas.openxmlformats.org/presentationml/2006/main">
   <p:cSld>
     <p:spTree>
@@ -28744,13 +29292,13 @@
   <p:clrMapOvr>
     <a:masterClrMapping/>
   </p:clrMapOvr>
-  <mc:AlternateContent xmlns:mc="http://schemas.openxmlformats.org/markup-compatibility/2006">
-    <mc:Choice xmlns:p159="http://schemas.microsoft.com/office/powerpoint/2015/09/main" Requires="p159">
+  <mc:AlternateContent xmlns:mc="http://schemas.openxmlformats.org/markup-compatibility/2006" xmlns:p159="http://schemas.microsoft.com/office/powerpoint/2015/09/main">
+    <mc:Choice Requires="p159">
       <p:transition spd="slow">
         <p159:morph option="byObject"/>
       </p:transition>
     </mc:Choice>
-    <mc:Fallback>
+    <mc:Fallback xmlns="">
       <p:transition spd="slow">
         <p:fade/>
       </p:transition>
@@ -28759,7 +29307,7 @@
 </p:sld>
 </file>
 
-<file path=ppt/slides/slide7.xml><?xml version="1.0" encoding="utf-8"?>
+<file path=ppt/slides/slide8.xml><?xml version="1.0" encoding="utf-8"?>
 <p:sld xmlns:a="http://schemas.openxmlformats.org/drawingml/2006/main" xmlns:r="http://schemas.openxmlformats.org/officeDocument/2006/relationships" xmlns:p="http://schemas.openxmlformats.org/presentationml/2006/main">
   <p:cSld>
     <p:spTree>
@@ -29039,13 +29587,13 @@
   <p:clrMapOvr>
     <a:masterClrMapping/>
   </p:clrMapOvr>
-  <mc:AlternateContent xmlns:mc="http://schemas.openxmlformats.org/markup-compatibility/2006">
-    <mc:Choice xmlns:p159="http://schemas.microsoft.com/office/powerpoint/2015/09/main" Requires="p159">
+  <mc:AlternateContent xmlns:mc="http://schemas.openxmlformats.org/markup-compatibility/2006" xmlns:p159="http://schemas.microsoft.com/office/powerpoint/2015/09/main">
+    <mc:Choice Requires="p159">
       <p:transition spd="slow">
         <p159:morph option="byObject"/>
       </p:transition>
     </mc:Choice>
-    <mc:Fallback>
+    <mc:Fallback xmlns="">
       <p:transition spd="slow">
         <p:fade/>
       </p:transition>
@@ -29054,7 +29602,7 @@
 </p:sld>
 </file>
 
-<file path=ppt/slides/slide8.xml><?xml version="1.0" encoding="utf-8"?>
+<file path=ppt/slides/slide9.xml><?xml version="1.0" encoding="utf-8"?>
 <p:sld xmlns:a="http://schemas.openxmlformats.org/drawingml/2006/main" xmlns:r="http://schemas.openxmlformats.org/officeDocument/2006/relationships" xmlns:p="http://schemas.openxmlformats.org/presentationml/2006/main">
   <p:cSld>
     <p:spTree>
@@ -29346,235 +29894,13 @@
   <p:clrMapOvr>
     <a:masterClrMapping/>
   </p:clrMapOvr>
-  <mc:AlternateContent xmlns:mc="http://schemas.openxmlformats.org/markup-compatibility/2006">
-    <mc:Choice xmlns:p159="http://schemas.microsoft.com/office/powerpoint/2015/09/main" Requires="p159">
+  <mc:AlternateContent xmlns:mc="http://schemas.openxmlformats.org/markup-compatibility/2006" xmlns:p159="http://schemas.microsoft.com/office/powerpoint/2015/09/main">
+    <mc:Choice Requires="p159">
       <p:transition spd="slow">
         <p159:morph option="byObject"/>
       </p:transition>
     </mc:Choice>
-    <mc:Fallback>
-      <p:transition spd="slow">
-        <p:fade/>
-      </p:transition>
-    </mc:Fallback>
-  </mc:AlternateContent>
-</p:sld>
-</file>
-
-<file path=ppt/slides/slide9.xml><?xml version="1.0" encoding="utf-8"?>
-<p:sld xmlns:a="http://schemas.openxmlformats.org/drawingml/2006/main" xmlns:r="http://schemas.openxmlformats.org/officeDocument/2006/relationships" xmlns:p="http://schemas.openxmlformats.org/presentationml/2006/main">
-  <p:cSld>
-    <p:spTree>
-      <p:nvGrpSpPr>
-        <p:cNvPr id="1" name=""/>
-        <p:cNvGrpSpPr/>
-        <p:nvPr/>
-      </p:nvGrpSpPr>
-      <p:grpSpPr>
-        <a:xfrm>
-          <a:off x="0" y="0"/>
-          <a:ext cx="0" cy="0"/>
-          <a:chOff x="0" y="0"/>
-          <a:chExt cx="0" cy="0"/>
-        </a:xfrm>
-      </p:grpSpPr>
-      <p:sp>
-        <p:nvSpPr>
-          <p:cNvPr id="2" name="Title 1">
-            <a:extLst>
-              <a:ext uri="{FF2B5EF4-FFF2-40B4-BE49-F238E27FC236}">
-                <a16:creationId xmlns:a16="http://schemas.microsoft.com/office/drawing/2014/main" id="{231062AF-BF9B-E224-9639-1CCA78408212}"/>
-              </a:ext>
-            </a:extLst>
-          </p:cNvPr>
-          <p:cNvSpPr>
-            <a:spLocks noGrp="1"/>
-          </p:cNvSpPr>
-          <p:nvPr>
-            <p:ph type="title"/>
-          </p:nvPr>
-        </p:nvSpPr>
-        <p:spPr>
-          <a:xfrm>
-            <a:off x="1141413" y="618518"/>
-            <a:ext cx="9905998" cy="1478570"/>
-          </a:xfrm>
-        </p:spPr>
-        <p:txBody>
-          <a:bodyPr/>
-          <a:lstStyle/>
-          <a:p>
-            <a:pPr algn="ctr"/>
-            <a:r>
-              <a:rPr lang="en-US" b="1">
-                <a:latin typeface="SF Pro Display" pitchFamily="50" charset="0"/>
-                <a:ea typeface="SF Pro Display" pitchFamily="50" charset="0"/>
-                <a:cs typeface="SF Pro Display" pitchFamily="50" charset="0"/>
-              </a:rPr>
-              <a:t>Software Requirements</a:t>
-            </a:r>
-            <a:endParaRPr lang="en-IN" b="1">
-              <a:latin typeface="SF Pro Display" pitchFamily="50" charset="0"/>
-              <a:ea typeface="SF Pro Display" pitchFamily="50" charset="0"/>
-              <a:cs typeface="SF Pro Display" pitchFamily="50" charset="0"/>
-            </a:endParaRPr>
-          </a:p>
-        </p:txBody>
-      </p:sp>
-      <p:sp>
-        <p:nvSpPr>
-          <p:cNvPr id="3" name="Content Placeholder 2">
-            <a:extLst>
-              <a:ext uri="{FF2B5EF4-FFF2-40B4-BE49-F238E27FC236}">
-                <a16:creationId xmlns:a16="http://schemas.microsoft.com/office/drawing/2014/main" id="{1FC9C90F-EC6A-7FA2-83CA-CA2E52D3A922}"/>
-              </a:ext>
-            </a:extLst>
-          </p:cNvPr>
-          <p:cNvSpPr>
-            <a:spLocks noGrp="1"/>
-          </p:cNvSpPr>
-          <p:nvPr>
-            <p:ph idx="1"/>
-          </p:nvPr>
-        </p:nvSpPr>
-        <p:spPr>
-          <a:xfrm>
-            <a:off x="1141412" y="2249487"/>
-            <a:ext cx="9905999" cy="3541714"/>
-          </a:xfrm>
-        </p:spPr>
-        <p:txBody>
-          <a:bodyPr anchor="t">
-            <a:noAutofit/>
-          </a:bodyPr>
-          <a:lstStyle/>
-          <a:p>
-            <a:r>
-              <a:rPr lang="en-US" sz="2800" dirty="0">
-                <a:latin typeface="SF Pro Text" pitchFamily="50" charset="0"/>
-                <a:ea typeface="SF Pro Text" pitchFamily="50" charset="0"/>
-                <a:cs typeface="SF Pro Text" pitchFamily="50" charset="0"/>
-              </a:rPr>
-              <a:t>P</a:t>
-            </a:r>
-            <a:r>
-              <a:rPr lang="en-IN" sz="2800" dirty="0" err="1">
-                <a:latin typeface="SF Pro Text" pitchFamily="50" charset="0"/>
-                <a:ea typeface="SF Pro Text" pitchFamily="50" charset="0"/>
-                <a:cs typeface="SF Pro Text" pitchFamily="50" charset="0"/>
-              </a:rPr>
-              <a:t>ython</a:t>
-            </a:r>
-            <a:r>
-              <a:rPr lang="en-IN" sz="2800" dirty="0">
-                <a:latin typeface="SF Pro Text" pitchFamily="50" charset="0"/>
-                <a:ea typeface="SF Pro Text" pitchFamily="50" charset="0"/>
-                <a:cs typeface="SF Pro Text" pitchFamily="50" charset="0"/>
-              </a:rPr>
-              <a:t>@^v3.12.0</a:t>
-            </a:r>
-          </a:p>
-          <a:p>
-            <a:r>
-              <a:rPr lang="en-IN" sz="2800" dirty="0">
-                <a:latin typeface="SF Pro Text" pitchFamily="50" charset="0"/>
-                <a:ea typeface="SF Pro Text" pitchFamily="50" charset="0"/>
-                <a:cs typeface="SF Pro Text" pitchFamily="50" charset="0"/>
-              </a:rPr>
-              <a:t>Tesseract-OCR@^v5.3.3</a:t>
-            </a:r>
-          </a:p>
-          <a:p>
-            <a:r>
-              <a:rPr lang="en-IN" sz="2800" dirty="0" err="1">
-                <a:latin typeface="SF Pro Text" pitchFamily="50" charset="0"/>
-                <a:ea typeface="SF Pro Text" pitchFamily="50" charset="0"/>
-                <a:cs typeface="SF Pro Text" pitchFamily="50" charset="0"/>
-              </a:rPr>
-              <a:t>pytesseract</a:t>
-            </a:r>
-            <a:r>
-              <a:rPr lang="en-IN" sz="2800" dirty="0">
-                <a:latin typeface="SF Pro Text" pitchFamily="50" charset="0"/>
-                <a:ea typeface="SF Pro Text" pitchFamily="50" charset="0"/>
-                <a:cs typeface="SF Pro Text" pitchFamily="50" charset="0"/>
-              </a:rPr>
-              <a:t>@^v0.3.10</a:t>
-            </a:r>
-          </a:p>
-          <a:p>
-            <a:r>
-              <a:rPr lang="en-IN" sz="2800" dirty="0" err="1">
-                <a:latin typeface="SF Pro Text" pitchFamily="50" charset="0"/>
-                <a:ea typeface="SF Pro Text" pitchFamily="50" charset="0"/>
-                <a:cs typeface="SF Pro Text" pitchFamily="50" charset="0"/>
-              </a:rPr>
-              <a:t>gTTS</a:t>
-            </a:r>
-            <a:r>
-              <a:rPr lang="en-IN" sz="2800" dirty="0">
-                <a:latin typeface="SF Pro Text" pitchFamily="50" charset="0"/>
-                <a:ea typeface="SF Pro Text" pitchFamily="50" charset="0"/>
-                <a:cs typeface="SF Pro Text" pitchFamily="50" charset="0"/>
-              </a:rPr>
-              <a:t>@^v2.4.0</a:t>
-            </a:r>
-          </a:p>
-          <a:p>
-            <a:r>
-              <a:rPr lang="en-IN" sz="2800" dirty="0" err="1">
-                <a:latin typeface="SF Pro Text" pitchFamily="50" charset="0"/>
-                <a:ea typeface="SF Pro Text" pitchFamily="50" charset="0"/>
-                <a:cs typeface="SF Pro Text" pitchFamily="50" charset="0"/>
-              </a:rPr>
-              <a:t>sounddevice</a:t>
-            </a:r>
-            <a:r>
-              <a:rPr lang="en-IN" sz="2800" dirty="0">
-                <a:latin typeface="SF Pro Text" pitchFamily="50" charset="0"/>
-                <a:ea typeface="SF Pro Text" pitchFamily="50" charset="0"/>
-                <a:cs typeface="SF Pro Text" pitchFamily="50" charset="0"/>
-              </a:rPr>
-              <a:t>@^v0.4.6</a:t>
-            </a:r>
-          </a:p>
-          <a:p>
-            <a:r>
-              <a:rPr lang="en-IN" sz="2800" dirty="0" err="1">
-                <a:latin typeface="SF Pro Text" pitchFamily="50" charset="0"/>
-                <a:ea typeface="SF Pro Text" pitchFamily="50" charset="0"/>
-                <a:cs typeface="SF Pro Text" pitchFamily="50" charset="0"/>
-              </a:rPr>
-              <a:t>soundfile</a:t>
-            </a:r>
-            <a:r>
-              <a:rPr lang="en-IN" sz="2800" dirty="0">
-                <a:latin typeface="SF Pro Text" pitchFamily="50" charset="0"/>
-                <a:ea typeface="SF Pro Text" pitchFamily="50" charset="0"/>
-                <a:cs typeface="SF Pro Text" pitchFamily="50" charset="0"/>
-              </a:rPr>
-              <a:t>@^v0.12.1</a:t>
-            </a:r>
-          </a:p>
-        </p:txBody>
-      </p:sp>
-    </p:spTree>
-    <p:extLst>
-      <p:ext uri="{BB962C8B-B14F-4D97-AF65-F5344CB8AC3E}">
-        <p14:creationId xmlns:p14="http://schemas.microsoft.com/office/powerpoint/2010/main" val="3062701205"/>
-      </p:ext>
-    </p:extLst>
-  </p:cSld>
-  <p:clrMapOvr>
-    <a:masterClrMapping/>
-  </p:clrMapOvr>
-  <mc:AlternateContent xmlns:mc="http://schemas.openxmlformats.org/markup-compatibility/2006">
-    <mc:Choice xmlns:p159="http://schemas.microsoft.com/office/powerpoint/2015/09/main" Requires="p159">
-      <p:transition spd="slow">
-        <p159:morph option="byObject"/>
-      </p:transition>
-    </mc:Choice>
-    <mc:Fallback>
+    <mc:Fallback xmlns="">
       <p:transition spd="slow">
         <p:fade/>
       </p:transition>

</xml_diff>